<commit_message>
updated presentation and added demo files
</commit_message>
<xml_diff>
--- a/Presentations/ContainersForWindowsDevs.pptx
+++ b/Presentations/ContainersForWindowsDevs.pptx
@@ -326,7 +326,7 @@
               <a:rPr lang="en-US" smtClean="0">
                 <a:latin typeface="Segoe UI" pitchFamily="34" charset="0"/>
               </a:rPr>
-              <a:t>8/25/2016 9:37 AM</a:t>
+              <a:t>8/25/2016 1:58 PM</a:t>
             </a:fld>
             <a:endParaRPr lang="en-US" dirty="0">
               <a:latin typeface="Segoe UI" pitchFamily="34" charset="0"/>
@@ -687,7 +687,7 @@
           <a:p>
             <a:fld id="{38EEC551-8CDA-4EB6-89BB-2A86C9F091C8}" type="datetime8">
               <a:rPr lang="en-US" smtClean="0"/>
-              <a:t>8/25/2016 9:37 AM</a:t>
+              <a:t>8/25/2016 1:58 PM</a:t>
             </a:fld>
             <a:endParaRPr lang="en-US" dirty="0"/>
           </a:p>
@@ -1077,7 +1077,7 @@
           <a:p>
             <a:fld id="{38EEC551-8CDA-4EB6-89BB-2A86C9F091C8}" type="datetime8">
               <a:rPr lang="en-US" smtClean="0"/>
-              <a:t>8/25/2016 9:37 AM</a:t>
+              <a:t>8/25/2016 1:58 PM</a:t>
             </a:fld>
             <a:endParaRPr lang="en-US" dirty="0"/>
           </a:p>
@@ -1462,7 +1462,7 @@
           <a:p>
             <a:fld id="{38EEC551-8CDA-4EB6-89BB-2A86C9F091C8}" type="datetime8">
               <a:rPr lang="en-US" smtClean="0"/>
-              <a:t>8/25/2016 9:37 AM</a:t>
+              <a:t>8/25/2016 1:58 PM</a:t>
             </a:fld>
             <a:endParaRPr lang="en-US" dirty="0"/>
           </a:p>
@@ -1664,7 +1664,7 @@
           <a:p>
             <a:fld id="{38EEC551-8CDA-4EB6-89BB-2A86C9F091C8}" type="datetime8">
               <a:rPr lang="en-US" smtClean="0"/>
-              <a:t>8/25/2016 9:37 AM</a:t>
+              <a:t>8/25/2016 1:58 PM</a:t>
             </a:fld>
             <a:endParaRPr lang="en-US" dirty="0"/>
           </a:p>
@@ -2909,285 +2909,6 @@
           <a:bodyPr/>
           <a:lstStyle/>
           <a:p>
-            <a:r>
-              <a:rPr lang="en-US" dirty="0"/>
-              <a:t>Lets take a closer look at a </a:t>
-            </a:r>
-            <a:r>
-              <a:rPr lang="en-US" dirty="0" err="1"/>
-              <a:t>Dockerfile</a:t>
-            </a:r>
-            <a:r>
-              <a:rPr lang="en-US" baseline="0" dirty="0"/>
-              <a:t> as this is really the preferred method if you can’t pull an existing image from a registry. </a:t>
-            </a:r>
-          </a:p>
-          <a:p>
-            <a:endParaRPr lang="en-US" baseline="0" dirty="0"/>
-          </a:p>
-          <a:p>
-            <a:r>
-              <a:rPr lang="en-US" b="1" baseline="0" dirty="0"/>
-              <a:t>#click (method for automated creation)</a:t>
-            </a:r>
-          </a:p>
-          <a:p>
-            <a:r>
-              <a:rPr lang="en-US" baseline="0" dirty="0"/>
-              <a:t>read</a:t>
-            </a:r>
-          </a:p>
-          <a:p>
-            <a:endParaRPr lang="en-US" baseline="0" dirty="0"/>
-          </a:p>
-          <a:p>
-            <a:r>
-              <a:rPr lang="en-US" b="1" baseline="0" dirty="0"/>
-              <a:t>#click (consumed when running </a:t>
-            </a:r>
-            <a:r>
-              <a:rPr lang="en-US" b="1" baseline="0" dirty="0" err="1"/>
-              <a:t>docker</a:t>
-            </a:r>
-            <a:r>
-              <a:rPr lang="en-US" b="1" baseline="0" dirty="0"/>
-              <a:t> build)</a:t>
-            </a:r>
-          </a:p>
-          <a:p>
-            <a:r>
-              <a:rPr lang="en-US" baseline="0" dirty="0"/>
-              <a:t>Its consumed when we say “</a:t>
-            </a:r>
-            <a:r>
-              <a:rPr lang="en-US" baseline="0" dirty="0" err="1"/>
-              <a:t>docker</a:t>
-            </a:r>
-            <a:r>
-              <a:rPr lang="en-US" baseline="0" dirty="0"/>
-              <a:t> build”. The build process reads this file</a:t>
-            </a:r>
-          </a:p>
-          <a:p>
-            <a:endParaRPr lang="en-US" baseline="0" dirty="0"/>
-          </a:p>
-          <a:p>
-            <a:r>
-              <a:rPr lang="en-US" b="1" baseline="0" dirty="0"/>
-              <a:t>#click (automated builds via </a:t>
-            </a:r>
-            <a:r>
-              <a:rPr lang="en-US" b="1" baseline="0" dirty="0" err="1"/>
-              <a:t>docker</a:t>
-            </a:r>
-            <a:r>
-              <a:rPr lang="en-US" b="1" baseline="0" dirty="0"/>
-              <a:t> hub)</a:t>
-            </a:r>
-          </a:p>
-          <a:p>
-            <a:r>
-              <a:rPr lang="en-US" baseline="0" dirty="0"/>
-              <a:t>It can also be used as part of automation. You can upload your </a:t>
-            </a:r>
-            <a:r>
-              <a:rPr lang="en-US" baseline="0" dirty="0" err="1"/>
-              <a:t>dockerfile</a:t>
-            </a:r>
-            <a:r>
-              <a:rPr lang="en-US" baseline="0" dirty="0"/>
-              <a:t> to the </a:t>
-            </a:r>
-            <a:r>
-              <a:rPr lang="en-US" baseline="0" dirty="0" err="1"/>
-              <a:t>docker</a:t>
-            </a:r>
-            <a:r>
-              <a:rPr lang="en-US" baseline="0" dirty="0"/>
-              <a:t> hub, it will help perform automated, triggered builds. So if an image (layer) that you’re dependent on changes, your image will also be updated. This includes a web hook that you can use to start any CI testing or even a redeployment of your image. </a:t>
-            </a:r>
-          </a:p>
-          <a:p>
-            <a:endParaRPr lang="en-US" baseline="0" dirty="0"/>
-          </a:p>
-          <a:p>
-            <a:r>
-              <a:rPr lang="en-US" b="1" baseline="0" dirty="0"/>
-              <a:t>#click (cache unchanged commands)</a:t>
-            </a:r>
-          </a:p>
-          <a:p>
-            <a:r>
-              <a:rPr lang="en-US" baseline="0" dirty="0"/>
-              <a:t>Anything that’s unchanged, just gets cached and reused. </a:t>
-            </a:r>
-          </a:p>
-          <a:p>
-            <a:endParaRPr lang="en-US" baseline="0" dirty="0"/>
-          </a:p>
-          <a:p>
-            <a:r>
-              <a:rPr lang="en-US" b="1" baseline="0" dirty="0"/>
-              <a:t>#click (IIS Image)</a:t>
-            </a:r>
-          </a:p>
-          <a:p>
-            <a:r>
-              <a:rPr lang="en-US" baseline="0" dirty="0"/>
-              <a:t>If we take an example of a </a:t>
-            </a:r>
-            <a:r>
-              <a:rPr lang="en-US" baseline="0" dirty="0" err="1"/>
-              <a:t>dockerfile</a:t>
-            </a:r>
-            <a:r>
-              <a:rPr lang="en-US" baseline="0" dirty="0"/>
-              <a:t> to build an IIS image. </a:t>
-            </a:r>
-          </a:p>
-          <a:p>
-            <a:r>
-              <a:rPr lang="en-US" baseline="0" dirty="0"/>
-              <a:t>From – we start with where we’re starting from, in this case a base Nano Server image. Then we have two ‘adds’</a:t>
-            </a:r>
-          </a:p>
-          <a:p>
-            <a:r>
-              <a:rPr lang="en-US" baseline="0" dirty="0"/>
-              <a:t>Unattended – the first is an unintended install file and this is how you’d install IIS with </a:t>
-            </a:r>
-            <a:r>
-              <a:rPr lang="en-US" baseline="0" dirty="0" err="1"/>
-              <a:t>nano</a:t>
-            </a:r>
-            <a:r>
-              <a:rPr lang="en-US" baseline="0" dirty="0"/>
-              <a:t> server technical preview 4</a:t>
-            </a:r>
-          </a:p>
-          <a:p>
-            <a:r>
-              <a:rPr lang="en-US" baseline="0" dirty="0"/>
-              <a:t>Packages – then we add in this case, the “packages” folder where those optional roles/features are stored as we discussed earlier. </a:t>
-            </a:r>
-          </a:p>
-          <a:p>
-            <a:r>
-              <a:rPr lang="en-US" baseline="0" dirty="0"/>
-              <a:t>Run – then within the container we’re going to use DISM to apply the </a:t>
-            </a:r>
-            <a:r>
-              <a:rPr lang="en-US" baseline="0" dirty="0" err="1"/>
-              <a:t>unattend</a:t>
-            </a:r>
-            <a:r>
-              <a:rPr lang="en-US" baseline="0" dirty="0"/>
-              <a:t> file we added. </a:t>
-            </a:r>
-          </a:p>
-          <a:p>
-            <a:endParaRPr lang="en-US" baseline="0" dirty="0"/>
-          </a:p>
-          <a:p>
-            <a:r>
-              <a:rPr lang="en-US" baseline="0" dirty="0"/>
-              <a:t>When its all done, we’ll have the layers we see on the right with the base image at the bottom, and our layers added on. </a:t>
-            </a:r>
-            <a:r>
-              <a:rPr lang="en-US" baseline="0" dirty="0" err="1"/>
-              <a:t>Mysite</a:t>
-            </a:r>
-            <a:r>
-              <a:rPr lang="en-US" baseline="0" dirty="0"/>
-              <a:t> depends on IIS, which depends on the Container image. Now if I wanted to share this with you, and you already have the container base image, all I’d need to ship him is the IIS image, and web image. If he had the IIS image, I’d just send him the web image. I only need to give him enough to provision what he needs to get started. </a:t>
-            </a:r>
-          </a:p>
-          <a:p>
-            <a:endParaRPr lang="en-US" baseline="0" dirty="0"/>
-          </a:p>
-          <a:p>
-            <a:r>
-              <a:rPr lang="en-US" baseline="0" dirty="0"/>
-              <a:t>This makes this approach very handy for sharing work. </a:t>
-            </a:r>
-          </a:p>
-          <a:p>
-            <a:endParaRPr lang="en-US" baseline="0" dirty="0"/>
-          </a:p>
-          <a:p>
-            <a:r>
-              <a:rPr lang="en-US" baseline="0" dirty="0"/>
-              <a:t>And there’s the 4 basic steps to build your own IIS container image. </a:t>
-            </a:r>
-          </a:p>
-          <a:p>
-            <a:endParaRPr lang="en-US" baseline="0" dirty="0"/>
-          </a:p>
-          <a:p>
-            <a:r>
-              <a:rPr lang="en-US" baseline="0" dirty="0"/>
-              <a:t>So lets talk about what “unchanged values are cached”. Lets say I made an mistake and I need to change the folder where my attend file was. Docker’s build process will look at it and say “I’ll keep the first three layers, and only throw away the last one”. So it’s the only one that gets re-run. It doesn’t have to re-add the </a:t>
-            </a:r>
-            <a:r>
-              <a:rPr lang="en-US" baseline="0" dirty="0" err="1"/>
-              <a:t>unattend</a:t>
-            </a:r>
-            <a:r>
-              <a:rPr lang="en-US" baseline="0" dirty="0"/>
-              <a:t> file, or the packages. It just updates the run layer. </a:t>
-            </a:r>
-          </a:p>
-          <a:p>
-            <a:endParaRPr lang="en-US" baseline="0" dirty="0"/>
-          </a:p>
-          <a:p>
-            <a:r>
-              <a:rPr lang="en-US" b="1" baseline="0" dirty="0"/>
-              <a:t>#click (</a:t>
-            </a:r>
-            <a:r>
-              <a:rPr lang="en-US" b="1" baseline="0" dirty="0" err="1"/>
-              <a:t>WebApp</a:t>
-            </a:r>
-            <a:r>
-              <a:rPr lang="en-US" b="1" baseline="0" dirty="0"/>
-              <a:t> image)</a:t>
-            </a:r>
-          </a:p>
-          <a:p>
-            <a:r>
-              <a:rPr lang="en-US" dirty="0"/>
-              <a:t>Now IIS is pretty useless without a web site, so lets create a new image that add this</a:t>
-            </a:r>
-          </a:p>
-          <a:p>
-            <a:r>
-              <a:rPr lang="en-US" dirty="0"/>
-              <a:t>From</a:t>
-            </a:r>
-            <a:r>
-              <a:rPr lang="en-US" baseline="0" dirty="0"/>
-              <a:t> – we’ll use the image we created previously </a:t>
-            </a:r>
-          </a:p>
-          <a:p>
-            <a:r>
-              <a:rPr lang="en-US" baseline="0" dirty="0"/>
-              <a:t>Add – and I’m going to add mysite.htm to the image in the /</a:t>
-            </a:r>
-            <a:r>
-              <a:rPr lang="en-US" baseline="0" dirty="0" err="1"/>
-              <a:t>inetpub</a:t>
-            </a:r>
-            <a:r>
-              <a:rPr lang="en-US" baseline="0" dirty="0"/>
-              <a:t> folder</a:t>
-            </a:r>
-          </a:p>
-          <a:p>
-            <a:endParaRPr lang="en-US" baseline="0" dirty="0"/>
-          </a:p>
-          <a:p>
             <a:endParaRPr lang="en-US" dirty="0"/>
           </a:p>
         </p:txBody>
@@ -3378,7 +3099,7 @@
           <a:p>
             <a:fld id="{38EEC551-8CDA-4EB6-89BB-2A86C9F091C8}" type="datetime8">
               <a:rPr lang="en-US" smtClean="0"/>
-              <a:t>8/25/2016 10:37 AM</a:t>
+              <a:t>8/25/2016 1:58 PM</a:t>
             </a:fld>
             <a:endParaRPr lang="en-US" dirty="0"/>
           </a:p>
@@ -3465,285 +3186,6 @@
           <a:bodyPr/>
           <a:lstStyle/>
           <a:p>
-            <a:r>
-              <a:rPr lang="en-US" dirty="0"/>
-              <a:t>Lets take a closer look at a </a:t>
-            </a:r>
-            <a:r>
-              <a:rPr lang="en-US" dirty="0" err="1"/>
-              <a:t>Dockerfile</a:t>
-            </a:r>
-            <a:r>
-              <a:rPr lang="en-US" baseline="0" dirty="0"/>
-              <a:t> as this is really the preferred method if you can’t pull an existing image from a registry. </a:t>
-            </a:r>
-          </a:p>
-          <a:p>
-            <a:endParaRPr lang="en-US" baseline="0" dirty="0"/>
-          </a:p>
-          <a:p>
-            <a:r>
-              <a:rPr lang="en-US" b="1" baseline="0" dirty="0"/>
-              <a:t>#click (method for automated creation)</a:t>
-            </a:r>
-          </a:p>
-          <a:p>
-            <a:r>
-              <a:rPr lang="en-US" baseline="0" dirty="0"/>
-              <a:t>read</a:t>
-            </a:r>
-          </a:p>
-          <a:p>
-            <a:endParaRPr lang="en-US" baseline="0" dirty="0"/>
-          </a:p>
-          <a:p>
-            <a:r>
-              <a:rPr lang="en-US" b="1" baseline="0" dirty="0"/>
-              <a:t>#click (consumed when running </a:t>
-            </a:r>
-            <a:r>
-              <a:rPr lang="en-US" b="1" baseline="0" dirty="0" err="1"/>
-              <a:t>docker</a:t>
-            </a:r>
-            <a:r>
-              <a:rPr lang="en-US" b="1" baseline="0" dirty="0"/>
-              <a:t> build)</a:t>
-            </a:r>
-          </a:p>
-          <a:p>
-            <a:r>
-              <a:rPr lang="en-US" baseline="0" dirty="0"/>
-              <a:t>Its consumed when we say “</a:t>
-            </a:r>
-            <a:r>
-              <a:rPr lang="en-US" baseline="0" dirty="0" err="1"/>
-              <a:t>docker</a:t>
-            </a:r>
-            <a:r>
-              <a:rPr lang="en-US" baseline="0" dirty="0"/>
-              <a:t> build”. The build process reads this file</a:t>
-            </a:r>
-          </a:p>
-          <a:p>
-            <a:endParaRPr lang="en-US" baseline="0" dirty="0"/>
-          </a:p>
-          <a:p>
-            <a:r>
-              <a:rPr lang="en-US" b="1" baseline="0" dirty="0"/>
-              <a:t>#click (automated builds via </a:t>
-            </a:r>
-            <a:r>
-              <a:rPr lang="en-US" b="1" baseline="0" dirty="0" err="1"/>
-              <a:t>docker</a:t>
-            </a:r>
-            <a:r>
-              <a:rPr lang="en-US" b="1" baseline="0" dirty="0"/>
-              <a:t> hub)</a:t>
-            </a:r>
-          </a:p>
-          <a:p>
-            <a:r>
-              <a:rPr lang="en-US" baseline="0" dirty="0"/>
-              <a:t>It can also be used as part of automation. You can upload your </a:t>
-            </a:r>
-            <a:r>
-              <a:rPr lang="en-US" baseline="0" dirty="0" err="1"/>
-              <a:t>dockerfile</a:t>
-            </a:r>
-            <a:r>
-              <a:rPr lang="en-US" baseline="0" dirty="0"/>
-              <a:t> to the </a:t>
-            </a:r>
-            <a:r>
-              <a:rPr lang="en-US" baseline="0" dirty="0" err="1"/>
-              <a:t>docker</a:t>
-            </a:r>
-            <a:r>
-              <a:rPr lang="en-US" baseline="0" dirty="0"/>
-              <a:t> hub, it will help perform automated, triggered builds. So if an image (layer) that you’re dependent on changes, your image will also be updated. This includes a web hook that you can use to start any CI testing or even a redeployment of your image. </a:t>
-            </a:r>
-          </a:p>
-          <a:p>
-            <a:endParaRPr lang="en-US" baseline="0" dirty="0"/>
-          </a:p>
-          <a:p>
-            <a:r>
-              <a:rPr lang="en-US" b="1" baseline="0" dirty="0"/>
-              <a:t>#click (cache unchanged commands)</a:t>
-            </a:r>
-          </a:p>
-          <a:p>
-            <a:r>
-              <a:rPr lang="en-US" baseline="0" dirty="0"/>
-              <a:t>Anything that’s unchanged, just gets cached and reused. </a:t>
-            </a:r>
-          </a:p>
-          <a:p>
-            <a:endParaRPr lang="en-US" baseline="0" dirty="0"/>
-          </a:p>
-          <a:p>
-            <a:r>
-              <a:rPr lang="en-US" b="1" baseline="0" dirty="0"/>
-              <a:t>#click (IIS Image)</a:t>
-            </a:r>
-          </a:p>
-          <a:p>
-            <a:r>
-              <a:rPr lang="en-US" baseline="0" dirty="0"/>
-              <a:t>If we take an example of a </a:t>
-            </a:r>
-            <a:r>
-              <a:rPr lang="en-US" baseline="0" dirty="0" err="1"/>
-              <a:t>dockerfile</a:t>
-            </a:r>
-            <a:r>
-              <a:rPr lang="en-US" baseline="0" dirty="0"/>
-              <a:t> to build an IIS image. </a:t>
-            </a:r>
-          </a:p>
-          <a:p>
-            <a:r>
-              <a:rPr lang="en-US" baseline="0" dirty="0"/>
-              <a:t>From – we start with where we’re starting from, in this case a base Nano Server image. Then we have two ‘adds’</a:t>
-            </a:r>
-          </a:p>
-          <a:p>
-            <a:r>
-              <a:rPr lang="en-US" baseline="0" dirty="0"/>
-              <a:t>Unattended – the first is an unintended install file and this is how you’d install IIS with </a:t>
-            </a:r>
-            <a:r>
-              <a:rPr lang="en-US" baseline="0" dirty="0" err="1"/>
-              <a:t>nano</a:t>
-            </a:r>
-            <a:r>
-              <a:rPr lang="en-US" baseline="0" dirty="0"/>
-              <a:t> server technical preview 4</a:t>
-            </a:r>
-          </a:p>
-          <a:p>
-            <a:r>
-              <a:rPr lang="en-US" baseline="0" dirty="0"/>
-              <a:t>Packages – then we add in this case, the “packages” folder where those optional roles/features are stored as we discussed earlier. </a:t>
-            </a:r>
-          </a:p>
-          <a:p>
-            <a:r>
-              <a:rPr lang="en-US" baseline="0" dirty="0"/>
-              <a:t>Run – then within the container we’re going to use DISM to apply the </a:t>
-            </a:r>
-            <a:r>
-              <a:rPr lang="en-US" baseline="0" dirty="0" err="1"/>
-              <a:t>unattend</a:t>
-            </a:r>
-            <a:r>
-              <a:rPr lang="en-US" baseline="0" dirty="0"/>
-              <a:t> file we added. </a:t>
-            </a:r>
-          </a:p>
-          <a:p>
-            <a:endParaRPr lang="en-US" baseline="0" dirty="0"/>
-          </a:p>
-          <a:p>
-            <a:r>
-              <a:rPr lang="en-US" baseline="0" dirty="0"/>
-              <a:t>When its all done, we’ll have the layers we see on the right with the base image at the bottom, and our layers added on. </a:t>
-            </a:r>
-            <a:r>
-              <a:rPr lang="en-US" baseline="0" dirty="0" err="1"/>
-              <a:t>Mysite</a:t>
-            </a:r>
-            <a:r>
-              <a:rPr lang="en-US" baseline="0" dirty="0"/>
-              <a:t> depends on IIS, which depends on the Container image. Now if I wanted to share this with you, and you already have the container base image, all I’d need to ship him is the IIS image, and web image. If he had the IIS image, I’d just send him the web image. I only need to give him enough to provision what he needs to get started. </a:t>
-            </a:r>
-          </a:p>
-          <a:p>
-            <a:endParaRPr lang="en-US" baseline="0" dirty="0"/>
-          </a:p>
-          <a:p>
-            <a:r>
-              <a:rPr lang="en-US" baseline="0" dirty="0"/>
-              <a:t>This makes this approach very handy for sharing work. </a:t>
-            </a:r>
-          </a:p>
-          <a:p>
-            <a:endParaRPr lang="en-US" baseline="0" dirty="0"/>
-          </a:p>
-          <a:p>
-            <a:r>
-              <a:rPr lang="en-US" baseline="0" dirty="0"/>
-              <a:t>And there’s the 4 basic steps to build your own IIS container image. </a:t>
-            </a:r>
-          </a:p>
-          <a:p>
-            <a:endParaRPr lang="en-US" baseline="0" dirty="0"/>
-          </a:p>
-          <a:p>
-            <a:r>
-              <a:rPr lang="en-US" baseline="0" dirty="0"/>
-              <a:t>So lets talk about what “unchanged values are cached”. Lets say I made an mistake and I need to change the folder where my attend file was. Docker’s build process will look at it and say “I’ll keep the first three layers, and only throw away the last one”. So it’s the only one that gets re-run. It doesn’t have to re-add the </a:t>
-            </a:r>
-            <a:r>
-              <a:rPr lang="en-US" baseline="0" dirty="0" err="1"/>
-              <a:t>unattend</a:t>
-            </a:r>
-            <a:r>
-              <a:rPr lang="en-US" baseline="0" dirty="0"/>
-              <a:t> file, or the packages. It just updates the run layer. </a:t>
-            </a:r>
-          </a:p>
-          <a:p>
-            <a:endParaRPr lang="en-US" baseline="0" dirty="0"/>
-          </a:p>
-          <a:p>
-            <a:r>
-              <a:rPr lang="en-US" b="1" baseline="0" dirty="0"/>
-              <a:t>#click (</a:t>
-            </a:r>
-            <a:r>
-              <a:rPr lang="en-US" b="1" baseline="0" dirty="0" err="1"/>
-              <a:t>WebApp</a:t>
-            </a:r>
-            <a:r>
-              <a:rPr lang="en-US" b="1" baseline="0" dirty="0"/>
-              <a:t> image)</a:t>
-            </a:r>
-          </a:p>
-          <a:p>
-            <a:r>
-              <a:rPr lang="en-US" dirty="0"/>
-              <a:t>Now IIS is pretty useless without a web site, so lets create a new image that add this</a:t>
-            </a:r>
-          </a:p>
-          <a:p>
-            <a:r>
-              <a:rPr lang="en-US" dirty="0"/>
-              <a:t>From</a:t>
-            </a:r>
-            <a:r>
-              <a:rPr lang="en-US" baseline="0" dirty="0"/>
-              <a:t> – we’ll use the image we created previously </a:t>
-            </a:r>
-          </a:p>
-          <a:p>
-            <a:r>
-              <a:rPr lang="en-US" baseline="0" dirty="0"/>
-              <a:t>Add – and I’m going to add mysite.htm to the image in the /</a:t>
-            </a:r>
-            <a:r>
-              <a:rPr lang="en-US" baseline="0" dirty="0" err="1"/>
-              <a:t>inetpub</a:t>
-            </a:r>
-            <a:r>
-              <a:rPr lang="en-US" baseline="0" dirty="0"/>
-              <a:t> folder</a:t>
-            </a:r>
-          </a:p>
-          <a:p>
-            <a:endParaRPr lang="en-US" baseline="0" dirty="0"/>
-          </a:p>
-          <a:p>
             <a:endParaRPr lang="en-US" dirty="0"/>
           </a:p>
         </p:txBody>
@@ -3828,285 +3270,6 @@
           <a:bodyPr/>
           <a:lstStyle/>
           <a:p>
-            <a:r>
-              <a:rPr lang="en-US" dirty="0"/>
-              <a:t>Lets take a closer look at a </a:t>
-            </a:r>
-            <a:r>
-              <a:rPr lang="en-US" dirty="0" err="1"/>
-              <a:t>Dockerfile</a:t>
-            </a:r>
-            <a:r>
-              <a:rPr lang="en-US" baseline="0" dirty="0"/>
-              <a:t> as this is really the preferred method if you can’t pull an existing image from a registry. </a:t>
-            </a:r>
-          </a:p>
-          <a:p>
-            <a:endParaRPr lang="en-US" baseline="0" dirty="0"/>
-          </a:p>
-          <a:p>
-            <a:r>
-              <a:rPr lang="en-US" b="1" baseline="0" dirty="0"/>
-              <a:t>#click (method for automated creation)</a:t>
-            </a:r>
-          </a:p>
-          <a:p>
-            <a:r>
-              <a:rPr lang="en-US" baseline="0" dirty="0"/>
-              <a:t>read</a:t>
-            </a:r>
-          </a:p>
-          <a:p>
-            <a:endParaRPr lang="en-US" baseline="0" dirty="0"/>
-          </a:p>
-          <a:p>
-            <a:r>
-              <a:rPr lang="en-US" b="1" baseline="0" dirty="0"/>
-              <a:t>#click (consumed when running </a:t>
-            </a:r>
-            <a:r>
-              <a:rPr lang="en-US" b="1" baseline="0" dirty="0" err="1"/>
-              <a:t>docker</a:t>
-            </a:r>
-            <a:r>
-              <a:rPr lang="en-US" b="1" baseline="0" dirty="0"/>
-              <a:t> build)</a:t>
-            </a:r>
-          </a:p>
-          <a:p>
-            <a:r>
-              <a:rPr lang="en-US" baseline="0" dirty="0"/>
-              <a:t>Its consumed when we say “</a:t>
-            </a:r>
-            <a:r>
-              <a:rPr lang="en-US" baseline="0" dirty="0" err="1"/>
-              <a:t>docker</a:t>
-            </a:r>
-            <a:r>
-              <a:rPr lang="en-US" baseline="0" dirty="0"/>
-              <a:t> build”. The build process reads this file</a:t>
-            </a:r>
-          </a:p>
-          <a:p>
-            <a:endParaRPr lang="en-US" baseline="0" dirty="0"/>
-          </a:p>
-          <a:p>
-            <a:r>
-              <a:rPr lang="en-US" b="1" baseline="0" dirty="0"/>
-              <a:t>#click (automated builds via </a:t>
-            </a:r>
-            <a:r>
-              <a:rPr lang="en-US" b="1" baseline="0" dirty="0" err="1"/>
-              <a:t>docker</a:t>
-            </a:r>
-            <a:r>
-              <a:rPr lang="en-US" b="1" baseline="0" dirty="0"/>
-              <a:t> hub)</a:t>
-            </a:r>
-          </a:p>
-          <a:p>
-            <a:r>
-              <a:rPr lang="en-US" baseline="0" dirty="0"/>
-              <a:t>It can also be used as part of automation. You can upload your </a:t>
-            </a:r>
-            <a:r>
-              <a:rPr lang="en-US" baseline="0" dirty="0" err="1"/>
-              <a:t>dockerfile</a:t>
-            </a:r>
-            <a:r>
-              <a:rPr lang="en-US" baseline="0" dirty="0"/>
-              <a:t> to the </a:t>
-            </a:r>
-            <a:r>
-              <a:rPr lang="en-US" baseline="0" dirty="0" err="1"/>
-              <a:t>docker</a:t>
-            </a:r>
-            <a:r>
-              <a:rPr lang="en-US" baseline="0" dirty="0"/>
-              <a:t> hub, it will help perform automated, triggered builds. So if an image (layer) that you’re dependent on changes, your image will also be updated. This includes a web hook that you can use to start any CI testing or even a redeployment of your image. </a:t>
-            </a:r>
-          </a:p>
-          <a:p>
-            <a:endParaRPr lang="en-US" baseline="0" dirty="0"/>
-          </a:p>
-          <a:p>
-            <a:r>
-              <a:rPr lang="en-US" b="1" baseline="0" dirty="0"/>
-              <a:t>#click (cache unchanged commands)</a:t>
-            </a:r>
-          </a:p>
-          <a:p>
-            <a:r>
-              <a:rPr lang="en-US" baseline="0" dirty="0"/>
-              <a:t>Anything that’s unchanged, just gets cached and reused. </a:t>
-            </a:r>
-          </a:p>
-          <a:p>
-            <a:endParaRPr lang="en-US" baseline="0" dirty="0"/>
-          </a:p>
-          <a:p>
-            <a:r>
-              <a:rPr lang="en-US" b="1" baseline="0" dirty="0"/>
-              <a:t>#click (IIS Image)</a:t>
-            </a:r>
-          </a:p>
-          <a:p>
-            <a:r>
-              <a:rPr lang="en-US" baseline="0" dirty="0"/>
-              <a:t>If we take an example of a </a:t>
-            </a:r>
-            <a:r>
-              <a:rPr lang="en-US" baseline="0" dirty="0" err="1"/>
-              <a:t>dockerfile</a:t>
-            </a:r>
-            <a:r>
-              <a:rPr lang="en-US" baseline="0" dirty="0"/>
-              <a:t> to build an IIS image. </a:t>
-            </a:r>
-          </a:p>
-          <a:p>
-            <a:r>
-              <a:rPr lang="en-US" baseline="0" dirty="0"/>
-              <a:t>From – we start with where we’re starting from, in this case a base Nano Server image. Then we have two ‘adds’</a:t>
-            </a:r>
-          </a:p>
-          <a:p>
-            <a:r>
-              <a:rPr lang="en-US" baseline="0" dirty="0"/>
-              <a:t>Unattended – the first is an unintended install file and this is how you’d install IIS with </a:t>
-            </a:r>
-            <a:r>
-              <a:rPr lang="en-US" baseline="0" dirty="0" err="1"/>
-              <a:t>nano</a:t>
-            </a:r>
-            <a:r>
-              <a:rPr lang="en-US" baseline="0" dirty="0"/>
-              <a:t> server technical preview 4</a:t>
-            </a:r>
-          </a:p>
-          <a:p>
-            <a:r>
-              <a:rPr lang="en-US" baseline="0" dirty="0"/>
-              <a:t>Packages – then we add in this case, the “packages” folder where those optional roles/features are stored as we discussed earlier. </a:t>
-            </a:r>
-          </a:p>
-          <a:p>
-            <a:r>
-              <a:rPr lang="en-US" baseline="0" dirty="0"/>
-              <a:t>Run – then within the container we’re going to use DISM to apply the </a:t>
-            </a:r>
-            <a:r>
-              <a:rPr lang="en-US" baseline="0" dirty="0" err="1"/>
-              <a:t>unattend</a:t>
-            </a:r>
-            <a:r>
-              <a:rPr lang="en-US" baseline="0" dirty="0"/>
-              <a:t> file we added. </a:t>
-            </a:r>
-          </a:p>
-          <a:p>
-            <a:endParaRPr lang="en-US" baseline="0" dirty="0"/>
-          </a:p>
-          <a:p>
-            <a:r>
-              <a:rPr lang="en-US" baseline="0" dirty="0"/>
-              <a:t>When its all done, we’ll have the layers we see on the right with the base image at the bottom, and our layers added on. </a:t>
-            </a:r>
-            <a:r>
-              <a:rPr lang="en-US" baseline="0" dirty="0" err="1"/>
-              <a:t>Mysite</a:t>
-            </a:r>
-            <a:r>
-              <a:rPr lang="en-US" baseline="0" dirty="0"/>
-              <a:t> depends on IIS, which depends on the Container image. Now if I wanted to share this with you, and you already have the container base image, all I’d need to ship him is the IIS image, and web image. If he had the IIS image, I’d just send him the web image. I only need to give him enough to provision what he needs to get started. </a:t>
-            </a:r>
-          </a:p>
-          <a:p>
-            <a:endParaRPr lang="en-US" baseline="0" dirty="0"/>
-          </a:p>
-          <a:p>
-            <a:r>
-              <a:rPr lang="en-US" baseline="0" dirty="0"/>
-              <a:t>This makes this approach very handy for sharing work. </a:t>
-            </a:r>
-          </a:p>
-          <a:p>
-            <a:endParaRPr lang="en-US" baseline="0" dirty="0"/>
-          </a:p>
-          <a:p>
-            <a:r>
-              <a:rPr lang="en-US" baseline="0" dirty="0"/>
-              <a:t>And there’s the 4 basic steps to build your own IIS container image. </a:t>
-            </a:r>
-          </a:p>
-          <a:p>
-            <a:endParaRPr lang="en-US" baseline="0" dirty="0"/>
-          </a:p>
-          <a:p>
-            <a:r>
-              <a:rPr lang="en-US" baseline="0" dirty="0"/>
-              <a:t>So lets talk about what “unchanged values are cached”. Lets say I made an mistake and I need to change the folder where my attend file was. Docker’s build process will look at it and say “I’ll keep the first three layers, and only throw away the last one”. So it’s the only one that gets re-run. It doesn’t have to re-add the </a:t>
-            </a:r>
-            <a:r>
-              <a:rPr lang="en-US" baseline="0" dirty="0" err="1"/>
-              <a:t>unattend</a:t>
-            </a:r>
-            <a:r>
-              <a:rPr lang="en-US" baseline="0" dirty="0"/>
-              <a:t> file, or the packages. It just updates the run layer. </a:t>
-            </a:r>
-          </a:p>
-          <a:p>
-            <a:endParaRPr lang="en-US" baseline="0" dirty="0"/>
-          </a:p>
-          <a:p>
-            <a:r>
-              <a:rPr lang="en-US" b="1" baseline="0" dirty="0"/>
-              <a:t>#click (</a:t>
-            </a:r>
-            <a:r>
-              <a:rPr lang="en-US" b="1" baseline="0" dirty="0" err="1"/>
-              <a:t>WebApp</a:t>
-            </a:r>
-            <a:r>
-              <a:rPr lang="en-US" b="1" baseline="0" dirty="0"/>
-              <a:t> image)</a:t>
-            </a:r>
-          </a:p>
-          <a:p>
-            <a:r>
-              <a:rPr lang="en-US" dirty="0"/>
-              <a:t>Now IIS is pretty useless without a web site, so lets create a new image that add this</a:t>
-            </a:r>
-          </a:p>
-          <a:p>
-            <a:r>
-              <a:rPr lang="en-US" dirty="0"/>
-              <a:t>From</a:t>
-            </a:r>
-            <a:r>
-              <a:rPr lang="en-US" baseline="0" dirty="0"/>
-              <a:t> – we’ll use the image we created previously </a:t>
-            </a:r>
-          </a:p>
-          <a:p>
-            <a:r>
-              <a:rPr lang="en-US" baseline="0" dirty="0"/>
-              <a:t>Add – and I’m going to add mysite.htm to the image in the /</a:t>
-            </a:r>
-            <a:r>
-              <a:rPr lang="en-US" baseline="0" dirty="0" err="1"/>
-              <a:t>inetpub</a:t>
-            </a:r>
-            <a:r>
-              <a:rPr lang="en-US" baseline="0" dirty="0"/>
-              <a:t> folder</a:t>
-            </a:r>
-          </a:p>
-          <a:p>
-            <a:endParaRPr lang="en-US" baseline="0" dirty="0"/>
-          </a:p>
-          <a:p>
             <a:endParaRPr lang="en-US" dirty="0"/>
           </a:p>
         </p:txBody>
@@ -4193,283 +3356,12 @@
           <a:p>
             <a:r>
               <a:rPr lang="en-US" dirty="0"/>
-              <a:t>Lets take a closer look at a </a:t>
-            </a:r>
-            <a:r>
-              <a:rPr lang="en-US" dirty="0" err="1"/>
-              <a:t>Dockerfile</a:t>
+              <a:t>Too many learning</a:t>
             </a:r>
             <a:r>
               <a:rPr lang="en-US" baseline="0" dirty="0"/>
-              <a:t> as this is really the preferred method if you can’t pull an existing image from a registry. </a:t>
-            </a:r>
-          </a:p>
-          <a:p>
-            <a:endParaRPr lang="en-US" baseline="0" dirty="0"/>
-          </a:p>
-          <a:p>
-            <a:r>
-              <a:rPr lang="en-US" b="1" baseline="0" dirty="0"/>
-              <a:t>#click (method for automated creation)</a:t>
-            </a:r>
-          </a:p>
-          <a:p>
-            <a:r>
-              <a:rPr lang="en-US" baseline="0" dirty="0"/>
-              <a:t>read</a:t>
-            </a:r>
-          </a:p>
-          <a:p>
-            <a:endParaRPr lang="en-US" baseline="0" dirty="0"/>
-          </a:p>
-          <a:p>
-            <a:r>
-              <a:rPr lang="en-US" b="1" baseline="0" dirty="0"/>
-              <a:t>#click (consumed when running </a:t>
-            </a:r>
-            <a:r>
-              <a:rPr lang="en-US" b="1" baseline="0" dirty="0" err="1"/>
-              <a:t>docker</a:t>
-            </a:r>
-            <a:r>
-              <a:rPr lang="en-US" b="1" baseline="0" dirty="0"/>
-              <a:t> build)</a:t>
-            </a:r>
-          </a:p>
-          <a:p>
-            <a:r>
-              <a:rPr lang="en-US" baseline="0" dirty="0"/>
-              <a:t>Its consumed when we say “</a:t>
-            </a:r>
-            <a:r>
-              <a:rPr lang="en-US" baseline="0" dirty="0" err="1"/>
-              <a:t>docker</a:t>
-            </a:r>
-            <a:r>
-              <a:rPr lang="en-US" baseline="0" dirty="0"/>
-              <a:t> build”. The build process reads this file</a:t>
-            </a:r>
-          </a:p>
-          <a:p>
-            <a:endParaRPr lang="en-US" baseline="0" dirty="0"/>
-          </a:p>
-          <a:p>
-            <a:r>
-              <a:rPr lang="en-US" b="1" baseline="0" dirty="0"/>
-              <a:t>#click (automated builds via </a:t>
-            </a:r>
-            <a:r>
-              <a:rPr lang="en-US" b="1" baseline="0" dirty="0" err="1"/>
-              <a:t>docker</a:t>
-            </a:r>
-            <a:r>
-              <a:rPr lang="en-US" b="1" baseline="0" dirty="0"/>
-              <a:t> hub)</a:t>
-            </a:r>
-          </a:p>
-          <a:p>
-            <a:r>
-              <a:rPr lang="en-US" baseline="0" dirty="0"/>
-              <a:t>It can also be used as part of automation. You can upload your </a:t>
-            </a:r>
-            <a:r>
-              <a:rPr lang="en-US" baseline="0" dirty="0" err="1"/>
-              <a:t>dockerfile</a:t>
-            </a:r>
-            <a:r>
-              <a:rPr lang="en-US" baseline="0" dirty="0"/>
-              <a:t> to the </a:t>
-            </a:r>
-            <a:r>
-              <a:rPr lang="en-US" baseline="0" dirty="0" err="1"/>
-              <a:t>docker</a:t>
-            </a:r>
-            <a:r>
-              <a:rPr lang="en-US" baseline="0" dirty="0"/>
-              <a:t> hub, it will help perform automated, triggered builds. So if an image (layer) that you’re dependent on changes, your image will also be updated. This includes a web hook that you can use to start any CI testing or even a redeployment of your image. </a:t>
-            </a:r>
-          </a:p>
-          <a:p>
-            <a:endParaRPr lang="en-US" baseline="0" dirty="0"/>
-          </a:p>
-          <a:p>
-            <a:r>
-              <a:rPr lang="en-US" b="1" baseline="0" dirty="0"/>
-              <a:t>#click (cache unchanged commands)</a:t>
-            </a:r>
-          </a:p>
-          <a:p>
-            <a:r>
-              <a:rPr lang="en-US" baseline="0" dirty="0"/>
-              <a:t>Anything that’s unchanged, just gets cached and reused. </a:t>
-            </a:r>
-          </a:p>
-          <a:p>
-            <a:endParaRPr lang="en-US" baseline="0" dirty="0"/>
-          </a:p>
-          <a:p>
-            <a:r>
-              <a:rPr lang="en-US" b="1" baseline="0" dirty="0"/>
-              <a:t>#click (IIS Image)</a:t>
-            </a:r>
-          </a:p>
-          <a:p>
-            <a:r>
-              <a:rPr lang="en-US" baseline="0" dirty="0"/>
-              <a:t>If we take an example of a </a:t>
-            </a:r>
-            <a:r>
-              <a:rPr lang="en-US" baseline="0" dirty="0" err="1"/>
-              <a:t>dockerfile</a:t>
-            </a:r>
-            <a:r>
-              <a:rPr lang="en-US" baseline="0" dirty="0"/>
-              <a:t> to build an IIS image. </a:t>
-            </a:r>
-          </a:p>
-          <a:p>
-            <a:r>
-              <a:rPr lang="en-US" baseline="0" dirty="0"/>
-              <a:t>From – we start with where we’re starting from, in this case a base Nano Server image. Then we have two ‘adds’</a:t>
-            </a:r>
-          </a:p>
-          <a:p>
-            <a:r>
-              <a:rPr lang="en-US" baseline="0" dirty="0"/>
-              <a:t>Unattended – the first is an unintended install file and this is how you’d install IIS with </a:t>
-            </a:r>
-            <a:r>
-              <a:rPr lang="en-US" baseline="0" dirty="0" err="1"/>
-              <a:t>nano</a:t>
-            </a:r>
-            <a:r>
-              <a:rPr lang="en-US" baseline="0" dirty="0"/>
-              <a:t> server technical preview 4</a:t>
-            </a:r>
-          </a:p>
-          <a:p>
-            <a:r>
-              <a:rPr lang="en-US" baseline="0" dirty="0"/>
-              <a:t>Packages – then we add in this case, the “packages” folder where those optional roles/features are stored as we discussed earlier. </a:t>
-            </a:r>
-          </a:p>
-          <a:p>
-            <a:r>
-              <a:rPr lang="en-US" baseline="0" dirty="0"/>
-              <a:t>Run – then within the container we’re going to use DISM to apply the </a:t>
-            </a:r>
-            <a:r>
-              <a:rPr lang="en-US" baseline="0" dirty="0" err="1"/>
-              <a:t>unattend</a:t>
-            </a:r>
-            <a:r>
-              <a:rPr lang="en-US" baseline="0" dirty="0"/>
-              <a:t> file we added. </a:t>
-            </a:r>
-          </a:p>
-          <a:p>
-            <a:endParaRPr lang="en-US" baseline="0" dirty="0"/>
-          </a:p>
-          <a:p>
-            <a:r>
-              <a:rPr lang="en-US" baseline="0" dirty="0"/>
-              <a:t>When its all done, we’ll have the layers we see on the right with the base image at the bottom, and our layers added on. </a:t>
-            </a:r>
-            <a:r>
-              <a:rPr lang="en-US" baseline="0" dirty="0" err="1"/>
-              <a:t>Mysite</a:t>
-            </a:r>
-            <a:r>
-              <a:rPr lang="en-US" baseline="0" dirty="0"/>
-              <a:t> depends on IIS, which depends on the Container image. Now if I wanted to share this with you, and you already have the container base image, all I’d need to ship him is the IIS image, and web image. If he had the IIS image, I’d just send him the web image. I only need to give him enough to provision what he needs to get started. </a:t>
-            </a:r>
-          </a:p>
-          <a:p>
-            <a:endParaRPr lang="en-US" baseline="0" dirty="0"/>
-          </a:p>
-          <a:p>
-            <a:r>
-              <a:rPr lang="en-US" baseline="0" dirty="0"/>
-              <a:t>This makes this approach very handy for sharing work. </a:t>
-            </a:r>
-          </a:p>
-          <a:p>
-            <a:endParaRPr lang="en-US" baseline="0" dirty="0"/>
-          </a:p>
-          <a:p>
-            <a:r>
-              <a:rPr lang="en-US" baseline="0" dirty="0"/>
-              <a:t>And there’s the 4 basic steps to build your own IIS container image. </a:t>
-            </a:r>
-          </a:p>
-          <a:p>
-            <a:endParaRPr lang="en-US" baseline="0" dirty="0"/>
-          </a:p>
-          <a:p>
-            <a:r>
-              <a:rPr lang="en-US" baseline="0" dirty="0"/>
-              <a:t>So lets talk about what “unchanged values are cached”. Lets say I made an mistake and I need to change the folder where my attend file was. Docker’s build process will look at it and say “I’ll keep the first three layers, and only throw away the last one”. So it’s the only one that gets re-run. It doesn’t have to re-add the </a:t>
-            </a:r>
-            <a:r>
-              <a:rPr lang="en-US" baseline="0" dirty="0" err="1"/>
-              <a:t>unattend</a:t>
-            </a:r>
-            <a:r>
-              <a:rPr lang="en-US" baseline="0" dirty="0"/>
-              <a:t> file, or the packages. It just updates the run layer. </a:t>
-            </a:r>
-          </a:p>
-          <a:p>
-            <a:endParaRPr lang="en-US" baseline="0" dirty="0"/>
-          </a:p>
-          <a:p>
-            <a:r>
-              <a:rPr lang="en-US" b="1" baseline="0" dirty="0"/>
-              <a:t>#click (</a:t>
-            </a:r>
-            <a:r>
-              <a:rPr lang="en-US" b="1" baseline="0" dirty="0" err="1"/>
-              <a:t>WebApp</a:t>
-            </a:r>
-            <a:r>
-              <a:rPr lang="en-US" b="1" baseline="0" dirty="0"/>
-              <a:t> image)</a:t>
-            </a:r>
-          </a:p>
-          <a:p>
-            <a:r>
-              <a:rPr lang="en-US" dirty="0"/>
-              <a:t>Now IIS is pretty useless without a web site, so lets create a new image that add this</a:t>
-            </a:r>
-          </a:p>
-          <a:p>
-            <a:r>
-              <a:rPr lang="en-US" dirty="0"/>
-              <a:t>From</a:t>
-            </a:r>
-            <a:r>
-              <a:rPr lang="en-US" baseline="0" dirty="0"/>
-              <a:t> – we’ll use the image we created previously </a:t>
-            </a:r>
-          </a:p>
-          <a:p>
-            <a:r>
-              <a:rPr lang="en-US" baseline="0" dirty="0"/>
-              <a:t>Add – and I’m going to add mysite.htm to the image in the /</a:t>
-            </a:r>
-            <a:r>
-              <a:rPr lang="en-US" baseline="0" dirty="0" err="1"/>
-              <a:t>inetpub</a:t>
-            </a:r>
-            <a:r>
-              <a:rPr lang="en-US" baseline="0" dirty="0"/>
-              <a:t> folder</a:t>
-            </a:r>
-          </a:p>
-          <a:p>
-            <a:endParaRPr lang="en-US" baseline="0" dirty="0"/>
-          </a:p>
-          <a:p>
+              <a:t> materials to list here. I’ve put some of my favorites on my blog along with a link to this presentation. Enjoy and check back for updates as things continue to mature. </a:t>
+            </a:r>
             <a:endParaRPr lang="en-US" dirty="0"/>
           </a:p>
         </p:txBody>
@@ -4599,7 +3491,7 @@
           <a:p>
             <a:fld id="{6108602D-D426-4C00-B215-BFA18C076426}" type="datetime8">
               <a:rPr lang="en-US" smtClean="0"/>
-              <a:t>8/25/2016 9:37 AM</a:t>
+              <a:t>8/25/2016 1:58 PM</a:t>
             </a:fld>
             <a:endParaRPr lang="en-US" dirty="0"/>
           </a:p>
@@ -4887,7 +3779,7 @@
           <a:p>
             <a:fld id="{90EC29EE-A8AD-4CE0-9C0B-116E0D4D7533}" type="datetime8">
               <a:rPr lang="en-US" smtClean="0"/>
-              <a:t>8/25/2016 10:18 AM</a:t>
+              <a:t>8/25/2016 2:19 PM</a:t>
             </a:fld>
             <a:endParaRPr lang="en-US" dirty="0"/>
           </a:p>
@@ -5154,7 +4046,7 @@
           <a:p>
             <a:fld id="{90EC29EE-A8AD-4CE0-9C0B-116E0D4D7533}" type="datetime8">
               <a:rPr lang="en-US" smtClean="0"/>
-              <a:t>8/25/2016 10:23 AM</a:t>
+              <a:t>8/25/2016 1:58 PM</a:t>
             </a:fld>
             <a:endParaRPr lang="en-US" dirty="0"/>
           </a:p>
@@ -5456,7 +4348,7 @@
           <a:p>
             <a:fld id="{90EC29EE-A8AD-4CE0-9C0B-116E0D4D7533}" type="datetime8">
               <a:rPr lang="en-US" smtClean="0"/>
-              <a:t>8/25/2016 10:32 AM</a:t>
+              <a:t>8/25/2016 1:58 PM</a:t>
             </a:fld>
             <a:endParaRPr lang="en-US" dirty="0"/>
           </a:p>
@@ -5731,7 +4623,7 @@
           <a:p>
             <a:fld id="{90EC29EE-A8AD-4CE0-9C0B-116E0D4D7533}" type="datetime8">
               <a:rPr lang="en-US" smtClean="0"/>
-              <a:t>8/25/2016 10:34 AM</a:t>
+              <a:t>8/25/2016 1:58 PM</a:t>
             </a:fld>
             <a:endParaRPr lang="en-US" dirty="0"/>
           </a:p>
@@ -21842,7 +20734,7 @@
         <p:spPr>
           <a:xfrm>
             <a:off x="274638" y="1212850"/>
-            <a:ext cx="9861218" cy="3361292"/>
+            <a:ext cx="9861218" cy="3844838"/>
           </a:xfrm>
         </p:spPr>
         <p:txBody>
@@ -21873,7 +20765,7 @@
               <a:buChar char="•"/>
             </a:pPr>
             <a:r>
-              <a:rPr lang="en-US" sz="2244" dirty="0"/>
+              <a:rPr lang="en-US" sz="2600" dirty="0"/>
               <a:t>Higher density and Reduced attack surface and servicing requirements</a:t>
             </a:r>
           </a:p>
@@ -21882,7 +20774,7 @@
               <a:buFont typeface="Arial" panose="020B0604020202020204" pitchFamily="34" charset="0"/>
               <a:buChar char="•"/>
             </a:pPr>
-            <a:endParaRPr lang="en-US" sz="2244" dirty="0"/>
+            <a:endParaRPr lang="en-US" sz="2600" dirty="0"/>
           </a:p>
           <a:p>
             <a:pPr marL="342834" lvl="1" indent="-342834">
@@ -21890,7 +20782,7 @@
               <a:buChar char="•"/>
             </a:pPr>
             <a:r>
-              <a:rPr lang="en-US" sz="2244" dirty="0"/>
+              <a:rPr lang="en-US" sz="2600" dirty="0"/>
               <a:t>Next-gen distributed app frameworks </a:t>
             </a:r>
           </a:p>
@@ -21899,7 +20791,7 @@
               <a:buFont typeface="Arial" panose="020B0604020202020204" pitchFamily="34" charset="0"/>
               <a:buChar char="•"/>
             </a:pPr>
-            <a:endParaRPr lang="en-US" sz="2244" dirty="0"/>
+            <a:endParaRPr lang="en-US" sz="2600" dirty="0"/>
           </a:p>
           <a:p>
             <a:pPr marL="342834" lvl="1" indent="-342834">
@@ -21907,11 +20799,11 @@
               <a:buChar char="•"/>
             </a:pPr>
             <a:r>
-              <a:rPr lang="en-US" sz="2244" dirty="0"/>
+              <a:rPr lang="en-US" sz="2600" dirty="0"/>
               <a:t>Interoperate with existing server applications</a:t>
             </a:r>
             <a:r>
-              <a:rPr lang="en-US" sz="2244" dirty="0">
+              <a:rPr lang="en-US" sz="2600" dirty="0">
                 <a:solidFill>
                   <a:schemeClr val="tx1"/>
                 </a:solidFill>
@@ -34027,33 +32919,15 @@
                                   </p:childTnLst>
                                 </p:cTn>
                               </p:par>
-                            </p:childTnLst>
-                          </p:cTn>
-                        </p:par>
-                      </p:childTnLst>
-                    </p:cTn>
-                  </p:par>
-                  <p:par>
-                    <p:cTn id="8" fill="hold">
-                      <p:stCondLst>
-                        <p:cond delay="indefinite"/>
-                      </p:stCondLst>
-                      <p:childTnLst>
-                        <p:par>
-                          <p:cTn id="9" fill="hold">
-                            <p:stCondLst>
-                              <p:cond delay="0"/>
-                            </p:stCondLst>
-                            <p:childTnLst>
                               <p:par>
-                                <p:cTn id="10" presetID="10" presetClass="entr" presetSubtype="0" fill="hold" nodeType="clickEffect">
+                                <p:cTn id="8" presetID="10" presetClass="entr" presetSubtype="0" fill="hold" nodeType="withEffect">
                                   <p:stCondLst>
                                     <p:cond delay="0"/>
                                   </p:stCondLst>
                                   <p:childTnLst>
                                     <p:set>
                                       <p:cBhvr>
-                                        <p:cTn id="11" dur="1" fill="hold">
+                                        <p:cTn id="9" dur="1" fill="hold">
                                           <p:stCondLst>
                                             <p:cond delay="0"/>
                                           </p:stCondLst>
@@ -34075,7 +32949,7 @@
                                     </p:set>
                                     <p:animEffect transition="in" filter="fade">
                                       <p:cBhvr>
-                                        <p:cTn id="12" dur="500"/>
+                                        <p:cTn id="10" dur="500"/>
                                         <p:tgtEl>
                                           <p:spTgt spid="3">
                                             <p:txEl>
@@ -34095,87 +32969,26 @@
                     </p:cTn>
                   </p:par>
                   <p:par>
-                    <p:cTn id="13" fill="hold">
+                    <p:cTn id="11" fill="hold">
                       <p:stCondLst>
                         <p:cond delay="indefinite"/>
                       </p:stCondLst>
                       <p:childTnLst>
                         <p:par>
-                          <p:cTn id="14" fill="hold">
+                          <p:cTn id="12" fill="hold">
                             <p:stCondLst>
                               <p:cond delay="0"/>
                             </p:stCondLst>
                             <p:childTnLst>
                               <p:par>
-                                <p:cTn id="15" presetID="10" presetClass="entr" presetSubtype="0" fill="hold" nodeType="clickEffect">
+                                <p:cTn id="13" presetID="10" presetClass="entr" presetSubtype="0" fill="hold" nodeType="clickEffect">
                                   <p:stCondLst>
                                     <p:cond delay="0"/>
                                   </p:stCondLst>
                                   <p:childTnLst>
                                     <p:set>
                                       <p:cBhvr>
-                                        <p:cTn id="16" dur="1" fill="hold">
-                                          <p:stCondLst>
-                                            <p:cond delay="0"/>
-                                          </p:stCondLst>
-                                        </p:cTn>
-                                        <p:tgtEl>
-                                          <p:spTgt spid="3">
-                                            <p:txEl>
-                                              <p:pRg st="2" end="2"/>
-                                            </p:txEl>
-                                          </p:spTgt>
-                                        </p:tgtEl>
-                                        <p:attrNameLst>
-                                          <p:attrName>style.visibility</p:attrName>
-                                        </p:attrNameLst>
-                                      </p:cBhvr>
-                                      <p:to>
-                                        <p:strVal val="visible"/>
-                                      </p:to>
-                                    </p:set>
-                                    <p:animEffect transition="in" filter="fade">
-                                      <p:cBhvr>
-                                        <p:cTn id="17" dur="500"/>
-                                        <p:tgtEl>
-                                          <p:spTgt spid="3">
-                                            <p:txEl>
-                                              <p:pRg st="2" end="2"/>
-                                            </p:txEl>
-                                          </p:spTgt>
-                                        </p:tgtEl>
-                                      </p:cBhvr>
-                                    </p:animEffect>
-                                  </p:childTnLst>
-                                </p:cTn>
-                              </p:par>
-                            </p:childTnLst>
-                          </p:cTn>
-                        </p:par>
-                      </p:childTnLst>
-                    </p:cTn>
-                  </p:par>
-                  <p:par>
-                    <p:cTn id="18" fill="hold">
-                      <p:stCondLst>
-                        <p:cond delay="indefinite"/>
-                      </p:stCondLst>
-                      <p:childTnLst>
-                        <p:par>
-                          <p:cTn id="19" fill="hold">
-                            <p:stCondLst>
-                              <p:cond delay="0"/>
-                            </p:stCondLst>
-                            <p:childTnLst>
-                              <p:par>
-                                <p:cTn id="20" presetID="10" presetClass="entr" presetSubtype="0" fill="hold" nodeType="clickEffect">
-                                  <p:stCondLst>
-                                    <p:cond delay="0"/>
-                                  </p:stCondLst>
-                                  <p:childTnLst>
-                                    <p:set>
-                                      <p:cBhvr>
-                                        <p:cTn id="21" dur="1" fill="hold">
+                                        <p:cTn id="14" dur="1" fill="hold">
                                           <p:stCondLst>
                                             <p:cond delay="0"/>
                                           </p:stCondLst>
@@ -34197,7 +33010,7 @@
                                     </p:set>
                                     <p:animEffect transition="in" filter="fade">
                                       <p:cBhvr>
-                                        <p:cTn id="22" dur="500"/>
+                                        <p:cTn id="15" dur="500"/>
                                         <p:tgtEl>
                                           <p:spTgt spid="3">
                                             <p:txEl>
@@ -34210,33 +33023,15 @@
                                   </p:childTnLst>
                                 </p:cTn>
                               </p:par>
-                            </p:childTnLst>
-                          </p:cTn>
-                        </p:par>
-                      </p:childTnLst>
-                    </p:cTn>
-                  </p:par>
-                  <p:par>
-                    <p:cTn id="23" fill="hold">
-                      <p:stCondLst>
-                        <p:cond delay="indefinite"/>
-                      </p:stCondLst>
-                      <p:childTnLst>
-                        <p:par>
-                          <p:cTn id="24" fill="hold">
-                            <p:stCondLst>
-                              <p:cond delay="0"/>
-                            </p:stCondLst>
-                            <p:childTnLst>
                               <p:par>
-                                <p:cTn id="25" presetID="10" presetClass="entr" presetSubtype="0" fill="hold" nodeType="clickEffect">
+                                <p:cTn id="16" presetID="10" presetClass="entr" presetSubtype="0" fill="hold" nodeType="withEffect">
                                   <p:stCondLst>
                                     <p:cond delay="0"/>
                                   </p:stCondLst>
                                   <p:childTnLst>
                                     <p:set>
                                       <p:cBhvr>
-                                        <p:cTn id="26" dur="1" fill="hold">
+                                        <p:cTn id="17" dur="1" fill="hold">
                                           <p:stCondLst>
                                             <p:cond delay="0"/>
                                           </p:stCondLst>
@@ -34258,7 +33053,7 @@
                                     </p:set>
                                     <p:animEffect transition="in" filter="fade">
                                       <p:cBhvr>
-                                        <p:cTn id="27" dur="500"/>
+                                        <p:cTn id="18" dur="500"/>
                                         <p:tgtEl>
                                           <p:spTgt spid="3">
                                             <p:txEl>
@@ -34278,87 +33073,26 @@
                     </p:cTn>
                   </p:par>
                   <p:par>
-                    <p:cTn id="28" fill="hold">
+                    <p:cTn id="19" fill="hold">
                       <p:stCondLst>
                         <p:cond delay="indefinite"/>
                       </p:stCondLst>
                       <p:childTnLst>
                         <p:par>
-                          <p:cTn id="29" fill="hold">
+                          <p:cTn id="20" fill="hold">
                             <p:stCondLst>
                               <p:cond delay="0"/>
                             </p:stCondLst>
                             <p:childTnLst>
                               <p:par>
-                                <p:cTn id="30" presetID="10" presetClass="entr" presetSubtype="0" fill="hold" nodeType="clickEffect">
+                                <p:cTn id="21" presetID="10" presetClass="entr" presetSubtype="0" fill="hold" nodeType="clickEffect">
                                   <p:stCondLst>
                                     <p:cond delay="0"/>
                                   </p:stCondLst>
                                   <p:childTnLst>
                                     <p:set>
                                       <p:cBhvr>
-                                        <p:cTn id="31" dur="1" fill="hold">
-                                          <p:stCondLst>
-                                            <p:cond delay="0"/>
-                                          </p:stCondLst>
-                                        </p:cTn>
-                                        <p:tgtEl>
-                                          <p:spTgt spid="3">
-                                            <p:txEl>
-                                              <p:pRg st="5" end="5"/>
-                                            </p:txEl>
-                                          </p:spTgt>
-                                        </p:tgtEl>
-                                        <p:attrNameLst>
-                                          <p:attrName>style.visibility</p:attrName>
-                                        </p:attrNameLst>
-                                      </p:cBhvr>
-                                      <p:to>
-                                        <p:strVal val="visible"/>
-                                      </p:to>
-                                    </p:set>
-                                    <p:animEffect transition="in" filter="fade">
-                                      <p:cBhvr>
-                                        <p:cTn id="32" dur="500"/>
-                                        <p:tgtEl>
-                                          <p:spTgt spid="3">
-                                            <p:txEl>
-                                              <p:pRg st="5" end="5"/>
-                                            </p:txEl>
-                                          </p:spTgt>
-                                        </p:tgtEl>
-                                      </p:cBhvr>
-                                    </p:animEffect>
-                                  </p:childTnLst>
-                                </p:cTn>
-                              </p:par>
-                            </p:childTnLst>
-                          </p:cTn>
-                        </p:par>
-                      </p:childTnLst>
-                    </p:cTn>
-                  </p:par>
-                  <p:par>
-                    <p:cTn id="33" fill="hold">
-                      <p:stCondLst>
-                        <p:cond delay="indefinite"/>
-                      </p:stCondLst>
-                      <p:childTnLst>
-                        <p:par>
-                          <p:cTn id="34" fill="hold">
-                            <p:stCondLst>
-                              <p:cond delay="0"/>
-                            </p:stCondLst>
-                            <p:childTnLst>
-                              <p:par>
-                                <p:cTn id="35" presetID="10" presetClass="entr" presetSubtype="0" fill="hold" nodeType="clickEffect">
-                                  <p:stCondLst>
-                                    <p:cond delay="0"/>
-                                  </p:stCondLst>
-                                  <p:childTnLst>
-                                    <p:set>
-                                      <p:cBhvr>
-                                        <p:cTn id="36" dur="1" fill="hold">
+                                        <p:cTn id="22" dur="1" fill="hold">
                                           <p:stCondLst>
                                             <p:cond delay="0"/>
                                           </p:stCondLst>
@@ -34380,7 +33114,7 @@
                                     </p:set>
                                     <p:animEffect transition="in" filter="fade">
                                       <p:cBhvr>
-                                        <p:cTn id="37" dur="500"/>
+                                        <p:cTn id="23" dur="500"/>
                                         <p:tgtEl>
                                           <p:spTgt spid="3">
                                             <p:txEl>
@@ -34393,33 +33127,15 @@
                                   </p:childTnLst>
                                 </p:cTn>
                               </p:par>
-                            </p:childTnLst>
-                          </p:cTn>
-                        </p:par>
-                      </p:childTnLst>
-                    </p:cTn>
-                  </p:par>
-                  <p:par>
-                    <p:cTn id="38" fill="hold">
-                      <p:stCondLst>
-                        <p:cond delay="indefinite"/>
-                      </p:stCondLst>
-                      <p:childTnLst>
-                        <p:par>
-                          <p:cTn id="39" fill="hold">
-                            <p:stCondLst>
-                              <p:cond delay="0"/>
-                            </p:stCondLst>
-                            <p:childTnLst>
                               <p:par>
-                                <p:cTn id="40" presetID="10" presetClass="entr" presetSubtype="0" fill="hold" nodeType="clickEffect">
+                                <p:cTn id="24" presetID="10" presetClass="entr" presetSubtype="0" fill="hold" nodeType="withEffect">
                                   <p:stCondLst>
                                     <p:cond delay="0"/>
                                   </p:stCondLst>
                                   <p:childTnLst>
                                     <p:set>
                                       <p:cBhvr>
-                                        <p:cTn id="41" dur="1" fill="hold">
+                                        <p:cTn id="25" dur="1" fill="hold">
                                           <p:stCondLst>
                                             <p:cond delay="0"/>
                                           </p:stCondLst>
@@ -34441,7 +33157,7 @@
                                     </p:set>
                                     <p:animEffect transition="in" filter="fade">
                                       <p:cBhvr>
-                                        <p:cTn id="42" dur="500"/>
+                                        <p:cTn id="26" dur="500"/>
                                         <p:tgtEl>
                                           <p:spTgt spid="3">
                                             <p:txEl>
@@ -34461,87 +33177,26 @@
                     </p:cTn>
                   </p:par>
                   <p:par>
-                    <p:cTn id="43" fill="hold">
+                    <p:cTn id="27" fill="hold">
                       <p:stCondLst>
                         <p:cond delay="indefinite"/>
                       </p:stCondLst>
                       <p:childTnLst>
                         <p:par>
-                          <p:cTn id="44" fill="hold">
+                          <p:cTn id="28" fill="hold">
                             <p:stCondLst>
                               <p:cond delay="0"/>
                             </p:stCondLst>
                             <p:childTnLst>
                               <p:par>
-                                <p:cTn id="45" presetID="10" presetClass="entr" presetSubtype="0" fill="hold" nodeType="clickEffect">
+                                <p:cTn id="29" presetID="10" presetClass="entr" presetSubtype="0" fill="hold" nodeType="clickEffect">
                                   <p:stCondLst>
                                     <p:cond delay="0"/>
                                   </p:stCondLst>
                                   <p:childTnLst>
                                     <p:set>
                                       <p:cBhvr>
-                                        <p:cTn id="46" dur="1" fill="hold">
-                                          <p:stCondLst>
-                                            <p:cond delay="0"/>
-                                          </p:stCondLst>
-                                        </p:cTn>
-                                        <p:tgtEl>
-                                          <p:spTgt spid="3">
-                                            <p:txEl>
-                                              <p:pRg st="8" end="8"/>
-                                            </p:txEl>
-                                          </p:spTgt>
-                                        </p:tgtEl>
-                                        <p:attrNameLst>
-                                          <p:attrName>style.visibility</p:attrName>
-                                        </p:attrNameLst>
-                                      </p:cBhvr>
-                                      <p:to>
-                                        <p:strVal val="visible"/>
-                                      </p:to>
-                                    </p:set>
-                                    <p:animEffect transition="in" filter="fade">
-                                      <p:cBhvr>
-                                        <p:cTn id="47" dur="500"/>
-                                        <p:tgtEl>
-                                          <p:spTgt spid="3">
-                                            <p:txEl>
-                                              <p:pRg st="8" end="8"/>
-                                            </p:txEl>
-                                          </p:spTgt>
-                                        </p:tgtEl>
-                                      </p:cBhvr>
-                                    </p:animEffect>
-                                  </p:childTnLst>
-                                </p:cTn>
-                              </p:par>
-                            </p:childTnLst>
-                          </p:cTn>
-                        </p:par>
-                      </p:childTnLst>
-                    </p:cTn>
-                  </p:par>
-                  <p:par>
-                    <p:cTn id="48" fill="hold">
-                      <p:stCondLst>
-                        <p:cond delay="indefinite"/>
-                      </p:stCondLst>
-                      <p:childTnLst>
-                        <p:par>
-                          <p:cTn id="49" fill="hold">
-                            <p:stCondLst>
-                              <p:cond delay="0"/>
-                            </p:stCondLst>
-                            <p:childTnLst>
-                              <p:par>
-                                <p:cTn id="50" presetID="10" presetClass="entr" presetSubtype="0" fill="hold" nodeType="clickEffect">
-                                  <p:stCondLst>
-                                    <p:cond delay="0"/>
-                                  </p:stCondLst>
-                                  <p:childTnLst>
-                                    <p:set>
-                                      <p:cBhvr>
-                                        <p:cTn id="51" dur="1" fill="hold">
+                                        <p:cTn id="30" dur="1" fill="hold">
                                           <p:stCondLst>
                                             <p:cond delay="0"/>
                                           </p:stCondLst>
@@ -34563,7 +33218,7 @@
                                     </p:set>
                                     <p:animEffect transition="in" filter="fade">
                                       <p:cBhvr>
-                                        <p:cTn id="52" dur="500"/>
+                                        <p:cTn id="31" dur="500"/>
                                         <p:tgtEl>
                                           <p:spTgt spid="3">
                                             <p:txEl>
@@ -34576,33 +33231,15 @@
                                   </p:childTnLst>
                                 </p:cTn>
                               </p:par>
-                            </p:childTnLst>
-                          </p:cTn>
-                        </p:par>
-                      </p:childTnLst>
-                    </p:cTn>
-                  </p:par>
-                  <p:par>
-                    <p:cTn id="53" fill="hold">
-                      <p:stCondLst>
-                        <p:cond delay="indefinite"/>
-                      </p:stCondLst>
-                      <p:childTnLst>
-                        <p:par>
-                          <p:cTn id="54" fill="hold">
-                            <p:stCondLst>
-                              <p:cond delay="0"/>
-                            </p:stCondLst>
-                            <p:childTnLst>
                               <p:par>
-                                <p:cTn id="55" presetID="10" presetClass="entr" presetSubtype="0" fill="hold" nodeType="clickEffect">
+                                <p:cTn id="32" presetID="10" presetClass="entr" presetSubtype="0" fill="hold" nodeType="withEffect">
                                   <p:stCondLst>
                                     <p:cond delay="0"/>
                                   </p:stCondLst>
                                   <p:childTnLst>
                                     <p:set>
                                       <p:cBhvr>
-                                        <p:cTn id="56" dur="1" fill="hold">
+                                        <p:cTn id="33" dur="1" fill="hold">
                                           <p:stCondLst>
                                             <p:cond delay="0"/>
                                           </p:stCondLst>
@@ -34624,7 +33261,7 @@
                                     </p:set>
                                     <p:animEffect transition="in" filter="fade">
                                       <p:cBhvr>
-                                        <p:cTn id="57" dur="500"/>
+                                        <p:cTn id="34" dur="500"/>
                                         <p:tgtEl>
                                           <p:spTgt spid="3">
                                             <p:txEl>
@@ -34970,33 +33607,15 @@
                                   </p:childTnLst>
                                 </p:cTn>
                               </p:par>
-                            </p:childTnLst>
-                          </p:cTn>
-                        </p:par>
-                      </p:childTnLst>
-                    </p:cTn>
-                  </p:par>
-                  <p:par>
-                    <p:cTn id="8" fill="hold">
-                      <p:stCondLst>
-                        <p:cond delay="indefinite"/>
-                      </p:stCondLst>
-                      <p:childTnLst>
-                        <p:par>
-                          <p:cTn id="9" fill="hold">
-                            <p:stCondLst>
-                              <p:cond delay="0"/>
-                            </p:stCondLst>
-                            <p:childTnLst>
                               <p:par>
-                                <p:cTn id="10" presetID="10" presetClass="entr" presetSubtype="0" fill="hold" nodeType="clickEffect">
+                                <p:cTn id="8" presetID="10" presetClass="entr" presetSubtype="0" fill="hold" nodeType="withEffect">
                                   <p:stCondLst>
                                     <p:cond delay="0"/>
                                   </p:stCondLst>
                                   <p:childTnLst>
                                     <p:set>
                                       <p:cBhvr>
-                                        <p:cTn id="11" dur="1" fill="hold">
+                                        <p:cTn id="9" dur="1" fill="hold">
                                           <p:stCondLst>
                                             <p:cond delay="0"/>
                                           </p:stCondLst>
@@ -35018,7 +33637,7 @@
                                     </p:set>
                                     <p:animEffect transition="in" filter="fade">
                                       <p:cBhvr>
-                                        <p:cTn id="12" dur="500"/>
+                                        <p:cTn id="10" dur="500"/>
                                         <p:tgtEl>
                                           <p:spTgt spid="3">
                                             <p:txEl>
@@ -35038,26 +33657,26 @@
                     </p:cTn>
                   </p:par>
                   <p:par>
-                    <p:cTn id="13" fill="hold">
+                    <p:cTn id="11" fill="hold">
                       <p:stCondLst>
                         <p:cond delay="indefinite"/>
                       </p:stCondLst>
                       <p:childTnLst>
                         <p:par>
-                          <p:cTn id="14" fill="hold">
+                          <p:cTn id="12" fill="hold">
                             <p:stCondLst>
                               <p:cond delay="0"/>
                             </p:stCondLst>
                             <p:childTnLst>
                               <p:par>
-                                <p:cTn id="15" presetID="10" presetClass="entr" presetSubtype="0" fill="hold" nodeType="clickEffect">
+                                <p:cTn id="13" presetID="10" presetClass="entr" presetSubtype="0" fill="hold" nodeType="clickEffect">
                                   <p:stCondLst>
                                     <p:cond delay="0"/>
                                   </p:stCondLst>
                                   <p:childTnLst>
                                     <p:set>
                                       <p:cBhvr>
-                                        <p:cTn id="16" dur="1" fill="hold">
+                                        <p:cTn id="14" dur="1" fill="hold">
                                           <p:stCondLst>
                                             <p:cond delay="0"/>
                                           </p:stCondLst>
@@ -35079,7 +33698,7 @@
                                     </p:set>
                                     <p:animEffect transition="in" filter="fade">
                                       <p:cBhvr>
-                                        <p:cTn id="17" dur="500"/>
+                                        <p:cTn id="15" dur="500"/>
                                         <p:tgtEl>
                                           <p:spTgt spid="3">
                                             <p:txEl>
@@ -35092,33 +33711,15 @@
                                   </p:childTnLst>
                                 </p:cTn>
                               </p:par>
-                            </p:childTnLst>
-                          </p:cTn>
-                        </p:par>
-                      </p:childTnLst>
-                    </p:cTn>
-                  </p:par>
-                  <p:par>
-                    <p:cTn id="18" fill="hold">
-                      <p:stCondLst>
-                        <p:cond delay="indefinite"/>
-                      </p:stCondLst>
-                      <p:childTnLst>
-                        <p:par>
-                          <p:cTn id="19" fill="hold">
-                            <p:stCondLst>
-                              <p:cond delay="0"/>
-                            </p:stCondLst>
-                            <p:childTnLst>
                               <p:par>
-                                <p:cTn id="20" presetID="10" presetClass="entr" presetSubtype="0" fill="hold" nodeType="clickEffect">
+                                <p:cTn id="16" presetID="10" presetClass="entr" presetSubtype="0" fill="hold" nodeType="withEffect">
                                   <p:stCondLst>
                                     <p:cond delay="0"/>
                                   </p:stCondLst>
                                   <p:childTnLst>
                                     <p:set>
                                       <p:cBhvr>
-                                        <p:cTn id="21" dur="1" fill="hold">
+                                        <p:cTn id="17" dur="1" fill="hold">
                                           <p:stCondLst>
                                             <p:cond delay="0"/>
                                           </p:stCondLst>
@@ -35140,7 +33741,7 @@
                                     </p:set>
                                     <p:animEffect transition="in" filter="fade">
                                       <p:cBhvr>
-                                        <p:cTn id="22" dur="500"/>
+                                        <p:cTn id="18" dur="500"/>
                                         <p:tgtEl>
                                           <p:spTgt spid="3">
                                             <p:txEl>
@@ -35160,26 +33761,26 @@
                     </p:cTn>
                   </p:par>
                   <p:par>
-                    <p:cTn id="23" fill="hold">
+                    <p:cTn id="19" fill="hold">
                       <p:stCondLst>
                         <p:cond delay="indefinite"/>
                       </p:stCondLst>
                       <p:childTnLst>
                         <p:par>
-                          <p:cTn id="24" fill="hold">
+                          <p:cTn id="20" fill="hold">
                             <p:stCondLst>
                               <p:cond delay="0"/>
                             </p:stCondLst>
                             <p:childTnLst>
                               <p:par>
-                                <p:cTn id="25" presetID="10" presetClass="entr" presetSubtype="0" fill="hold" nodeType="clickEffect">
+                                <p:cTn id="21" presetID="10" presetClass="entr" presetSubtype="0" fill="hold" nodeType="clickEffect">
                                   <p:stCondLst>
                                     <p:cond delay="0"/>
                                   </p:stCondLst>
                                   <p:childTnLst>
                                     <p:set>
                                       <p:cBhvr>
-                                        <p:cTn id="26" dur="1" fill="hold">
+                                        <p:cTn id="22" dur="1" fill="hold">
                                           <p:stCondLst>
                                             <p:cond delay="0"/>
                                           </p:stCondLst>
@@ -35201,7 +33802,7 @@
                                     </p:set>
                                     <p:animEffect transition="in" filter="fade">
                                       <p:cBhvr>
-                                        <p:cTn id="27" dur="500"/>
+                                        <p:cTn id="23" dur="500"/>
                                         <p:tgtEl>
                                           <p:spTgt spid="3">
                                             <p:txEl>
@@ -35214,33 +33815,15 @@
                                   </p:childTnLst>
                                 </p:cTn>
                               </p:par>
-                            </p:childTnLst>
-                          </p:cTn>
-                        </p:par>
-                      </p:childTnLst>
-                    </p:cTn>
-                  </p:par>
-                  <p:par>
-                    <p:cTn id="28" fill="hold">
-                      <p:stCondLst>
-                        <p:cond delay="indefinite"/>
-                      </p:stCondLst>
-                      <p:childTnLst>
-                        <p:par>
-                          <p:cTn id="29" fill="hold">
-                            <p:stCondLst>
-                              <p:cond delay="0"/>
-                            </p:stCondLst>
-                            <p:childTnLst>
                               <p:par>
-                                <p:cTn id="30" presetID="10" presetClass="entr" presetSubtype="0" fill="hold" nodeType="clickEffect">
+                                <p:cTn id="24" presetID="10" presetClass="entr" presetSubtype="0" fill="hold" nodeType="withEffect">
                                   <p:stCondLst>
                                     <p:cond delay="0"/>
                                   </p:stCondLst>
                                   <p:childTnLst>
                                     <p:set>
                                       <p:cBhvr>
-                                        <p:cTn id="31" dur="1" fill="hold">
+                                        <p:cTn id="25" dur="1" fill="hold">
                                           <p:stCondLst>
                                             <p:cond delay="0"/>
                                           </p:stCondLst>
@@ -35262,7 +33845,7 @@
                                     </p:set>
                                     <p:animEffect transition="in" filter="fade">
                                       <p:cBhvr>
-                                        <p:cTn id="32" dur="500"/>
+                                        <p:cTn id="26" dur="500"/>
                                         <p:tgtEl>
                                           <p:spTgt spid="3">
                                             <p:txEl>
@@ -35282,26 +33865,26 @@
                     </p:cTn>
                   </p:par>
                   <p:par>
-                    <p:cTn id="33" fill="hold">
+                    <p:cTn id="27" fill="hold">
                       <p:stCondLst>
                         <p:cond delay="indefinite"/>
                       </p:stCondLst>
                       <p:childTnLst>
                         <p:par>
-                          <p:cTn id="34" fill="hold">
+                          <p:cTn id="28" fill="hold">
                             <p:stCondLst>
                               <p:cond delay="0"/>
                             </p:stCondLst>
                             <p:childTnLst>
                               <p:par>
-                                <p:cTn id="35" presetID="10" presetClass="entr" presetSubtype="0" fill="hold" nodeType="clickEffect">
+                                <p:cTn id="29" presetID="10" presetClass="entr" presetSubtype="0" fill="hold" nodeType="clickEffect">
                                   <p:stCondLst>
                                     <p:cond delay="0"/>
                                   </p:stCondLst>
                                   <p:childTnLst>
                                     <p:set>
                                       <p:cBhvr>
-                                        <p:cTn id="36" dur="1" fill="hold">
+                                        <p:cTn id="30" dur="1" fill="hold">
                                           <p:stCondLst>
                                             <p:cond delay="0"/>
                                           </p:stCondLst>
@@ -35323,7 +33906,7 @@
                                     </p:set>
                                     <p:animEffect transition="in" filter="fade">
                                       <p:cBhvr>
-                                        <p:cTn id="37" dur="500"/>
+                                        <p:cTn id="31" dur="500"/>
                                         <p:tgtEl>
                                           <p:spTgt spid="3">
                                             <p:txEl>
@@ -35336,33 +33919,15 @@
                                   </p:childTnLst>
                                 </p:cTn>
                               </p:par>
-                            </p:childTnLst>
-                          </p:cTn>
-                        </p:par>
-                      </p:childTnLst>
-                    </p:cTn>
-                  </p:par>
-                  <p:par>
-                    <p:cTn id="38" fill="hold">
-                      <p:stCondLst>
-                        <p:cond delay="indefinite"/>
-                      </p:stCondLst>
-                      <p:childTnLst>
-                        <p:par>
-                          <p:cTn id="39" fill="hold">
-                            <p:stCondLst>
-                              <p:cond delay="0"/>
-                            </p:stCondLst>
-                            <p:childTnLst>
                               <p:par>
-                                <p:cTn id="40" presetID="10" presetClass="entr" presetSubtype="0" fill="hold" nodeType="clickEffect">
+                                <p:cTn id="32" presetID="10" presetClass="entr" presetSubtype="0" fill="hold" nodeType="withEffect">
                                   <p:stCondLst>
                                     <p:cond delay="0"/>
                                   </p:stCondLst>
                                   <p:childTnLst>
                                     <p:set>
                                       <p:cBhvr>
-                                        <p:cTn id="41" dur="1" fill="hold">
+                                        <p:cTn id="33" dur="1" fill="hold">
                                           <p:stCondLst>
                                             <p:cond delay="0"/>
                                           </p:stCondLst>
@@ -35384,7 +33949,7 @@
                                     </p:set>
                                     <p:animEffect transition="in" filter="fade">
                                       <p:cBhvr>
-                                        <p:cTn id="42" dur="500"/>
+                                        <p:cTn id="34" dur="500"/>
                                         <p:tgtEl>
                                           <p:spTgt spid="3">
                                             <p:txEl>
@@ -35404,26 +33969,26 @@
                     </p:cTn>
                   </p:par>
                   <p:par>
-                    <p:cTn id="43" fill="hold">
+                    <p:cTn id="35" fill="hold">
                       <p:stCondLst>
                         <p:cond delay="indefinite"/>
                       </p:stCondLst>
                       <p:childTnLst>
                         <p:par>
-                          <p:cTn id="44" fill="hold">
+                          <p:cTn id="36" fill="hold">
                             <p:stCondLst>
                               <p:cond delay="0"/>
                             </p:stCondLst>
                             <p:childTnLst>
                               <p:par>
-                                <p:cTn id="45" presetID="10" presetClass="entr" presetSubtype="0" fill="hold" nodeType="clickEffect">
+                                <p:cTn id="37" presetID="10" presetClass="entr" presetSubtype="0" fill="hold" nodeType="clickEffect">
                                   <p:stCondLst>
                                     <p:cond delay="0"/>
                                   </p:stCondLst>
                                   <p:childTnLst>
                                     <p:set>
                                       <p:cBhvr>
-                                        <p:cTn id="46" dur="1" fill="hold">
+                                        <p:cTn id="38" dur="1" fill="hold">
                                           <p:stCondLst>
                                             <p:cond delay="0"/>
                                           </p:stCondLst>
@@ -35445,7 +34010,7 @@
                                     </p:set>
                                     <p:animEffect transition="in" filter="fade">
                                       <p:cBhvr>
-                                        <p:cTn id="47" dur="500"/>
+                                        <p:cTn id="39" dur="500"/>
                                         <p:tgtEl>
                                           <p:spTgt spid="3">
                                             <p:txEl>
@@ -35458,33 +34023,15 @@
                                   </p:childTnLst>
                                 </p:cTn>
                               </p:par>
-                            </p:childTnLst>
-                          </p:cTn>
-                        </p:par>
-                      </p:childTnLst>
-                    </p:cTn>
-                  </p:par>
-                  <p:par>
-                    <p:cTn id="48" fill="hold">
-                      <p:stCondLst>
-                        <p:cond delay="indefinite"/>
-                      </p:stCondLst>
-                      <p:childTnLst>
-                        <p:par>
-                          <p:cTn id="49" fill="hold">
-                            <p:stCondLst>
-                              <p:cond delay="0"/>
-                            </p:stCondLst>
-                            <p:childTnLst>
                               <p:par>
-                                <p:cTn id="50" presetID="10" presetClass="entr" presetSubtype="0" fill="hold" nodeType="clickEffect">
+                                <p:cTn id="40" presetID="10" presetClass="entr" presetSubtype="0" fill="hold" nodeType="withEffect">
                                   <p:stCondLst>
                                     <p:cond delay="0"/>
                                   </p:stCondLst>
                                   <p:childTnLst>
                                     <p:set>
                                       <p:cBhvr>
-                                        <p:cTn id="51" dur="1" fill="hold">
+                                        <p:cTn id="41" dur="1" fill="hold">
                                           <p:stCondLst>
                                             <p:cond delay="0"/>
                                           </p:stCondLst>
@@ -35506,7 +34053,7 @@
                                     </p:set>
                                     <p:animEffect transition="in" filter="fade">
                                       <p:cBhvr>
-                                        <p:cTn id="52" dur="500"/>
+                                        <p:cTn id="42" dur="500"/>
                                         <p:tgtEl>
                                           <p:spTgt spid="3">
                                             <p:txEl>
@@ -35728,7 +34275,7 @@
         <p:spPr>
           <a:xfrm>
             <a:off x="274638" y="1212850"/>
-            <a:ext cx="11887200" cy="5103812"/>
+            <a:ext cx="11887200" cy="5387108"/>
           </a:xfrm>
         </p:spPr>
         <p:txBody>
@@ -35814,7 +34361,16 @@
               <a:rPr lang="en-US" sz="4400" b="1" dirty="0">
                 <a:latin typeface="+mn-lt"/>
               </a:rPr>
-              <a:t>Remove all containers</a:t>
+              <a:t>Remove all containers </a:t>
+            </a:r>
+            <a:r>
+              <a:rPr lang="en-US" sz="4400" b="1" dirty="0">
+                <a:solidFill>
+                  <a:srgbClr val="FF0000"/>
+                </a:solidFill>
+                <a:latin typeface="+mn-lt"/>
+              </a:rPr>
+              <a:t>(use with caution)</a:t>
             </a:r>
           </a:p>
           <a:p>
@@ -35836,7 +34392,7 @@
             </a:r>
             <a:r>
               <a:rPr lang="en-US" sz="2800" dirty="0"/>
-              <a:t> –a –format “{{.ID}}” | %{</a:t>
+              <a:t> –a -–format “{{.ID}}” | %{</a:t>
             </a:r>
             <a:r>
               <a:rPr lang="en-US" sz="2800" dirty="0" err="1"/>
@@ -35925,7 +34481,7 @@
                             </p:stCondLst>
                             <p:childTnLst>
                               <p:par>
-                                <p:cTn id="5" presetID="10" presetClass="entr" presetSubtype="0" fill="hold" nodeType="clickEffect">
+                                <p:cTn id="5" presetID="1" presetClass="entr" presetSubtype="0" fill="hold" nodeType="clickEffect">
                                   <p:stCondLst>
                                     <p:cond delay="0"/>
                                   </p:stCondLst>
@@ -35933,6 +34489,37 @@
                                     <p:set>
                                       <p:cBhvr>
                                         <p:cTn id="6" dur="1" fill="hold">
+                                          <p:stCondLst>
+                                            <p:cond delay="0"/>
+                                          </p:stCondLst>
+                                        </p:cTn>
+                                        <p:tgtEl>
+                                          <p:spTgt spid="3">
+                                            <p:txEl>
+                                              <p:pRg st="0" end="0"/>
+                                            </p:txEl>
+                                          </p:spTgt>
+                                        </p:tgtEl>
+                                        <p:attrNameLst>
+                                          <p:attrName>style.visibility</p:attrName>
+                                        </p:attrNameLst>
+                                      </p:cBhvr>
+                                      <p:to>
+                                        <p:strVal val="visible"/>
+                                      </p:to>
+                                    </p:set>
+                                  </p:childTnLst>
+                                </p:cTn>
+                              </p:par>
+                              <p:par>
+                                <p:cTn id="7" presetID="1" presetClass="entr" presetSubtype="0" fill="hold" nodeType="withEffect">
+                                  <p:stCondLst>
+                                    <p:cond delay="0"/>
+                                  </p:stCondLst>
+                                  <p:childTnLst>
+                                    <p:set>
+                                      <p:cBhvr>
+                                        <p:cTn id="8" dur="1" fill="hold">
                                           <p:stCondLst>
                                             <p:cond delay="0"/>
                                           </p:stCondLst>
@@ -35952,18 +34539,6 @@
                                         <p:strVal val="visible"/>
                                       </p:to>
                                     </p:set>
-                                    <p:animEffect transition="in" filter="fade">
-                                      <p:cBhvr>
-                                        <p:cTn id="7" dur="500"/>
-                                        <p:tgtEl>
-                                          <p:spTgt spid="3">
-                                            <p:txEl>
-                                              <p:pRg st="1" end="1"/>
-                                            </p:txEl>
-                                          </p:spTgt>
-                                        </p:tgtEl>
-                                      </p:cBhvr>
-                                    </p:animEffect>
                                   </p:childTnLst>
                                 </p:cTn>
                               </p:par>
@@ -35974,87 +34549,26 @@
                     </p:cTn>
                   </p:par>
                   <p:par>
-                    <p:cTn id="8" fill="hold">
+                    <p:cTn id="9" fill="hold">
                       <p:stCondLst>
                         <p:cond delay="indefinite"/>
                       </p:stCondLst>
                       <p:childTnLst>
                         <p:par>
-                          <p:cTn id="9" fill="hold">
+                          <p:cTn id="10" fill="hold">
                             <p:stCondLst>
                               <p:cond delay="0"/>
                             </p:stCondLst>
                             <p:childTnLst>
                               <p:par>
-                                <p:cTn id="10" presetID="10" presetClass="entr" presetSubtype="0" fill="hold" nodeType="clickEffect">
+                                <p:cTn id="11" presetID="1" presetClass="entr" presetSubtype="0" fill="hold" nodeType="clickEffect">
                                   <p:stCondLst>
                                     <p:cond delay="0"/>
                                   </p:stCondLst>
                                   <p:childTnLst>
                                     <p:set>
                                       <p:cBhvr>
-                                        <p:cTn id="11" dur="1" fill="hold">
-                                          <p:stCondLst>
-                                            <p:cond delay="0"/>
-                                          </p:stCondLst>
-                                        </p:cTn>
-                                        <p:tgtEl>
-                                          <p:spTgt spid="3">
-                                            <p:txEl>
-                                              <p:pRg st="0" end="0"/>
-                                            </p:txEl>
-                                          </p:spTgt>
-                                        </p:tgtEl>
-                                        <p:attrNameLst>
-                                          <p:attrName>style.visibility</p:attrName>
-                                        </p:attrNameLst>
-                                      </p:cBhvr>
-                                      <p:to>
-                                        <p:strVal val="visible"/>
-                                      </p:to>
-                                    </p:set>
-                                    <p:animEffect transition="in" filter="fade">
-                                      <p:cBhvr>
-                                        <p:cTn id="12" dur="500"/>
-                                        <p:tgtEl>
-                                          <p:spTgt spid="3">
-                                            <p:txEl>
-                                              <p:pRg st="0" end="0"/>
-                                            </p:txEl>
-                                          </p:spTgt>
-                                        </p:tgtEl>
-                                      </p:cBhvr>
-                                    </p:animEffect>
-                                  </p:childTnLst>
-                                </p:cTn>
-                              </p:par>
-                            </p:childTnLst>
-                          </p:cTn>
-                        </p:par>
-                      </p:childTnLst>
-                    </p:cTn>
-                  </p:par>
-                  <p:par>
-                    <p:cTn id="13" fill="hold">
-                      <p:stCondLst>
-                        <p:cond delay="indefinite"/>
-                      </p:stCondLst>
-                      <p:childTnLst>
-                        <p:par>
-                          <p:cTn id="14" fill="hold">
-                            <p:stCondLst>
-                              <p:cond delay="0"/>
-                            </p:stCondLst>
-                            <p:childTnLst>
-                              <p:par>
-                                <p:cTn id="15" presetID="10" presetClass="entr" presetSubtype="0" fill="hold" nodeType="clickEffect">
-                                  <p:stCondLst>
-                                    <p:cond delay="0"/>
-                                  </p:stCondLst>
-                                  <p:childTnLst>
-                                    <p:set>
-                                      <p:cBhvr>
-                                        <p:cTn id="16" dur="1" fill="hold">
+                                        <p:cTn id="12" dur="1" fill="hold">
                                           <p:stCondLst>
                                             <p:cond delay="0"/>
                                           </p:stCondLst>
@@ -36074,48 +34588,18 @@
                                         <p:strVal val="visible"/>
                                       </p:to>
                                     </p:set>
-                                    <p:animEffect transition="in" filter="fade">
-                                      <p:cBhvr>
-                                        <p:cTn id="17" dur="500"/>
-                                        <p:tgtEl>
-                                          <p:spTgt spid="3">
-                                            <p:txEl>
-                                              <p:pRg st="3" end="3"/>
-                                            </p:txEl>
-                                          </p:spTgt>
-                                        </p:tgtEl>
-                                      </p:cBhvr>
-                                    </p:animEffect>
                                   </p:childTnLst>
                                 </p:cTn>
                               </p:par>
-                            </p:childTnLst>
-                          </p:cTn>
-                        </p:par>
-                      </p:childTnLst>
-                    </p:cTn>
-                  </p:par>
-                  <p:par>
-                    <p:cTn id="18" fill="hold">
-                      <p:stCondLst>
-                        <p:cond delay="indefinite"/>
-                      </p:stCondLst>
-                      <p:childTnLst>
-                        <p:par>
-                          <p:cTn id="19" fill="hold">
-                            <p:stCondLst>
-                              <p:cond delay="0"/>
-                            </p:stCondLst>
-                            <p:childTnLst>
                               <p:par>
-                                <p:cTn id="20" presetID="10" presetClass="entr" presetSubtype="0" fill="hold" nodeType="clickEffect">
+                                <p:cTn id="13" presetID="1" presetClass="entr" presetSubtype="0" fill="hold" nodeType="withEffect">
                                   <p:stCondLst>
                                     <p:cond delay="0"/>
                                   </p:stCondLst>
                                   <p:childTnLst>
                                     <p:set>
                                       <p:cBhvr>
-                                        <p:cTn id="21" dur="1" fill="hold">
+                                        <p:cTn id="14" dur="1" fill="hold">
                                           <p:stCondLst>
                                             <p:cond delay="0"/>
                                           </p:stCondLst>
@@ -36135,18 +34619,6 @@
                                         <p:strVal val="visible"/>
                                       </p:to>
                                     </p:set>
-                                    <p:animEffect transition="in" filter="fade">
-                                      <p:cBhvr>
-                                        <p:cTn id="22" dur="500"/>
-                                        <p:tgtEl>
-                                          <p:spTgt spid="3">
-                                            <p:txEl>
-                                              <p:pRg st="4" end="4"/>
-                                            </p:txEl>
-                                          </p:spTgt>
-                                        </p:tgtEl>
-                                      </p:cBhvr>
-                                    </p:animEffect>
                                   </p:childTnLst>
                                 </p:cTn>
                               </p:par>
@@ -36157,26 +34629,57 @@
                     </p:cTn>
                   </p:par>
                   <p:par>
-                    <p:cTn id="23" fill="hold">
+                    <p:cTn id="15" fill="hold">
                       <p:stCondLst>
                         <p:cond delay="indefinite"/>
                       </p:stCondLst>
                       <p:childTnLst>
                         <p:par>
-                          <p:cTn id="24" fill="hold">
+                          <p:cTn id="16" fill="hold">
                             <p:stCondLst>
                               <p:cond delay="0"/>
                             </p:stCondLst>
                             <p:childTnLst>
                               <p:par>
-                                <p:cTn id="25" presetID="10" presetClass="entr" presetSubtype="0" fill="hold" nodeType="clickEffect">
+                                <p:cTn id="17" presetID="1" presetClass="entr" presetSubtype="0" fill="hold" nodeType="clickEffect">
                                   <p:stCondLst>
                                     <p:cond delay="0"/>
                                   </p:stCondLst>
                                   <p:childTnLst>
                                     <p:set>
                                       <p:cBhvr>
-                                        <p:cTn id="26" dur="1" fill="hold">
+                                        <p:cTn id="18" dur="1" fill="hold">
+                                          <p:stCondLst>
+                                            <p:cond delay="0"/>
+                                          </p:stCondLst>
+                                        </p:cTn>
+                                        <p:tgtEl>
+                                          <p:spTgt spid="3">
+                                            <p:txEl>
+                                              <p:pRg st="6" end="6"/>
+                                            </p:txEl>
+                                          </p:spTgt>
+                                        </p:tgtEl>
+                                        <p:attrNameLst>
+                                          <p:attrName>style.visibility</p:attrName>
+                                        </p:attrNameLst>
+                                      </p:cBhvr>
+                                      <p:to>
+                                        <p:strVal val="visible"/>
+                                      </p:to>
+                                    </p:set>
+                                  </p:childTnLst>
+                                </p:cTn>
+                              </p:par>
+                              <p:par>
+                                <p:cTn id="19" presetID="1" presetClass="entr" presetSubtype="0" fill="hold" nodeType="withEffect">
+                                  <p:stCondLst>
+                                    <p:cond delay="0"/>
+                                  </p:stCondLst>
+                                  <p:childTnLst>
+                                    <p:set>
+                                      <p:cBhvr>
+                                        <p:cTn id="20" dur="1" fill="hold">
                                           <p:stCondLst>
                                             <p:cond delay="0"/>
                                           </p:stCondLst>
@@ -36196,79 +34699,6 @@
                                         <p:strVal val="visible"/>
                                       </p:to>
                                     </p:set>
-                                    <p:animEffect transition="in" filter="fade">
-                                      <p:cBhvr>
-                                        <p:cTn id="27" dur="500"/>
-                                        <p:tgtEl>
-                                          <p:spTgt spid="3">
-                                            <p:txEl>
-                                              <p:pRg st="7" end="7"/>
-                                            </p:txEl>
-                                          </p:spTgt>
-                                        </p:tgtEl>
-                                      </p:cBhvr>
-                                    </p:animEffect>
-                                  </p:childTnLst>
-                                </p:cTn>
-                              </p:par>
-                            </p:childTnLst>
-                          </p:cTn>
-                        </p:par>
-                      </p:childTnLst>
-                    </p:cTn>
-                  </p:par>
-                  <p:par>
-                    <p:cTn id="28" fill="hold">
-                      <p:stCondLst>
-                        <p:cond delay="indefinite"/>
-                      </p:stCondLst>
-                      <p:childTnLst>
-                        <p:par>
-                          <p:cTn id="29" fill="hold">
-                            <p:stCondLst>
-                              <p:cond delay="0"/>
-                            </p:stCondLst>
-                            <p:childTnLst>
-                              <p:par>
-                                <p:cTn id="30" presetID="10" presetClass="entr" presetSubtype="0" fill="hold" nodeType="clickEffect">
-                                  <p:stCondLst>
-                                    <p:cond delay="0"/>
-                                  </p:stCondLst>
-                                  <p:childTnLst>
-                                    <p:set>
-                                      <p:cBhvr>
-                                        <p:cTn id="31" dur="1" fill="hold">
-                                          <p:stCondLst>
-                                            <p:cond delay="0"/>
-                                          </p:stCondLst>
-                                        </p:cTn>
-                                        <p:tgtEl>
-                                          <p:spTgt spid="3">
-                                            <p:txEl>
-                                              <p:pRg st="6" end="6"/>
-                                            </p:txEl>
-                                          </p:spTgt>
-                                        </p:tgtEl>
-                                        <p:attrNameLst>
-                                          <p:attrName>style.visibility</p:attrName>
-                                        </p:attrNameLst>
-                                      </p:cBhvr>
-                                      <p:to>
-                                        <p:strVal val="visible"/>
-                                      </p:to>
-                                    </p:set>
-                                    <p:animEffect transition="in" filter="fade">
-                                      <p:cBhvr>
-                                        <p:cTn id="32" dur="500"/>
-                                        <p:tgtEl>
-                                          <p:spTgt spid="3">
-                                            <p:txEl>
-                                              <p:pRg st="6" end="6"/>
-                                            </p:txEl>
-                                          </p:spTgt>
-                                        </p:tgtEl>
-                                      </p:cBhvr>
-                                    </p:animEffect>
                                   </p:childTnLst>
                                 </p:cTn>
                               </p:par>
@@ -36322,85 +34752,6 @@
       </p:grpSpPr>
       <p:sp>
         <p:nvSpPr>
-          <p:cNvPr id="20" name="Rectangle 19"/>
-          <p:cNvSpPr/>
-          <p:nvPr/>
-        </p:nvSpPr>
-        <p:spPr bwMode="auto">
-          <a:xfrm>
-            <a:off x="8275637" y="1820862"/>
-            <a:ext cx="4160838" cy="5173663"/>
-          </a:xfrm>
-          <a:prstGeom prst="rect">
-            <a:avLst/>
-          </a:prstGeom>
-          <a:solidFill>
-            <a:schemeClr val="accent5">
-              <a:lumMod val="20000"/>
-              <a:lumOff val="80000"/>
-            </a:schemeClr>
-          </a:solidFill>
-          <a:ln>
-            <a:noFill/>
-            <a:headEnd type="none" w="med" len="med"/>
-            <a:tailEnd type="none" w="med" len="med"/>
-          </a:ln>
-          <a:effectLst/>
-        </p:spPr>
-        <p:style>
-          <a:lnRef idx="1">
-            <a:schemeClr val="accent2"/>
-          </a:lnRef>
-          <a:fillRef idx="3">
-            <a:schemeClr val="accent2"/>
-          </a:fillRef>
-          <a:effectRef idx="2">
-            <a:schemeClr val="accent2"/>
-          </a:effectRef>
-          <a:fontRef idx="minor">
-            <a:schemeClr val="lt1"/>
-          </a:fontRef>
-        </p:style>
-        <p:txBody>
-          <a:bodyPr rot="0" spcFirstLastPara="0" vertOverflow="overflow" horzOverflow="overflow" vert="horz" wrap="square" lIns="182880" tIns="146304" rIns="182880" bIns="146304" numCol="1" spcCol="0" rtlCol="0" fromWordArt="0" anchor="t" anchorCtr="0" forceAA="0" compatLnSpc="1">
-            <a:prstTxWarp prst="textNoShape">
-              <a:avLst/>
-            </a:prstTxWarp>
-            <a:noAutofit/>
-          </a:bodyPr>
-          <a:lstStyle/>
-          <a:p>
-            <a:pPr algn="ctr" defTabSz="932472" fontAlgn="base">
-              <a:lnSpc>
-                <a:spcPct val="90000"/>
-              </a:lnSpc>
-              <a:spcBef>
-                <a:spcPct val="0"/>
-              </a:spcBef>
-              <a:spcAft>
-                <a:spcPct val="0"/>
-              </a:spcAft>
-            </a:pPr>
-            <a:endParaRPr lang="en-US" sz="2400" dirty="0" err="1">
-              <a:gradFill>
-                <a:gsLst>
-                  <a:gs pos="0">
-                    <a:srgbClr val="FFFFFF"/>
-                  </a:gs>
-                  <a:gs pos="100000">
-                    <a:srgbClr val="FFFFFF"/>
-                  </a:gs>
-                </a:gsLst>
-                <a:lin ang="5400000" scaled="0"/>
-              </a:gradFill>
-              <a:ea typeface="Segoe UI" pitchFamily="34" charset="0"/>
-              <a:cs typeface="Segoe UI" pitchFamily="34" charset="0"/>
-            </a:endParaRPr>
-          </a:p>
-        </p:txBody>
-      </p:sp>
-      <p:sp>
-        <p:nvSpPr>
           <p:cNvPr id="2" name="Title 1"/>
           <p:cNvSpPr>
             <a:spLocks noGrp="1"/>
@@ -36438,8 +34789,8 @@
         </p:nvSpPr>
         <p:spPr>
           <a:xfrm>
-            <a:off x="280447" y="1129307"/>
-            <a:ext cx="8979884" cy="5577348"/>
+            <a:off x="280447" y="1348914"/>
+            <a:ext cx="11195590" cy="4947728"/>
           </a:xfrm>
         </p:spPr>
         <p:txBody>
@@ -36449,41 +34800,50 @@
           <a:lstStyle/>
           <a:p>
             <a:r>
-              <a:rPr lang="en-US" dirty="0"/>
+              <a:rPr lang="en-US" sz="3600" dirty="0"/>
               <a:t>Method for automated container image creation</a:t>
             </a:r>
           </a:p>
           <a:p>
-            <a:r>
-              <a:rPr lang="en-US" dirty="0"/>
+            <a:endParaRPr lang="en-US" sz="3600" dirty="0"/>
+          </a:p>
+          <a:p>
+            <a:r>
+              <a:rPr lang="en-US" sz="3600" dirty="0"/>
               <a:t>Consumed when running “</a:t>
             </a:r>
             <a:r>
-              <a:rPr lang="en-US" dirty="0" err="1"/>
+              <a:rPr lang="en-US" sz="3600" dirty="0" err="1"/>
               <a:t>docker</a:t>
             </a:r>
             <a:r>
-              <a:rPr lang="en-US" dirty="0"/>
+              <a:rPr lang="en-US" sz="3600" dirty="0"/>
               <a:t> build” </a:t>
             </a:r>
           </a:p>
           <a:p>
-            <a:r>
-              <a:rPr lang="en-US" dirty="0"/>
+            <a:endParaRPr lang="en-US" sz="3600" dirty="0"/>
+          </a:p>
+          <a:p>
+            <a:r>
+              <a:rPr lang="en-US" sz="3600" dirty="0"/>
               <a:t>Enables automated builds via </a:t>
             </a:r>
             <a:r>
-              <a:rPr lang="en-US" dirty="0" err="1"/>
+              <a:rPr lang="en-US" sz="3600" dirty="0" err="1"/>
               <a:t>docker</a:t>
             </a:r>
             <a:r>
-              <a:rPr lang="en-US" dirty="0"/>
+              <a:rPr lang="en-US" sz="3600" dirty="0"/>
               <a:t> hub</a:t>
             </a:r>
           </a:p>
           <a:p>
-            <a:r>
-              <a:rPr lang="en-US" dirty="0"/>
+            <a:endParaRPr lang="en-US" sz="3600" dirty="0"/>
+          </a:p>
+          <a:p>
+            <a:r>
+              <a:rPr lang="en-US" sz="3600" dirty="0"/>
               <a:t>Caches unchanged commands</a:t>
             </a:r>
           </a:p>
@@ -36491,229 +34851,114 @@
       </p:sp>
       <p:grpSp>
         <p:nvGrpSpPr>
-          <p:cNvPr id="21" name="Group 20"/>
+          <p:cNvPr id="19" name="Group 18"/>
           <p:cNvGrpSpPr/>
           <p:nvPr/>
         </p:nvGrpSpPr>
         <p:grpSpPr>
           <a:xfrm>
-            <a:off x="9254523" y="2146690"/>
-            <a:ext cx="2335606" cy="4149261"/>
-            <a:chOff x="9637979" y="1567671"/>
-            <a:chExt cx="2335606" cy="4149261"/>
+            <a:off x="8839199" y="2283419"/>
+            <a:ext cx="4160838" cy="4947643"/>
+            <a:chOff x="8275637" y="1820862"/>
+            <a:chExt cx="4160838" cy="5173663"/>
           </a:xfrm>
         </p:grpSpPr>
-        <p:pic>
-          <p:nvPicPr>
-            <p:cNvPr id="4" name="Picture 3"/>
-            <p:cNvPicPr>
-              <a:picLocks noChangeAspect="1"/>
-            </p:cNvPicPr>
+        <p:sp>
+          <p:nvSpPr>
+            <p:cNvPr id="20" name="Rectangle 19"/>
+            <p:cNvSpPr/>
             <p:nvPr/>
-          </p:nvPicPr>
-          <p:blipFill>
-            <a:blip r:embed="rId3"/>
-            <a:stretch>
-              <a:fillRect/>
-            </a:stretch>
-          </p:blipFill>
-          <p:spPr>
+          </p:nvSpPr>
+          <p:spPr bwMode="auto">
             <a:xfrm>
-              <a:off x="9653481" y="4387590"/>
-              <a:ext cx="2320104" cy="1329342"/>
+              <a:off x="8275637" y="1820862"/>
+              <a:ext cx="4160838" cy="5173663"/>
             </a:xfrm>
             <a:prstGeom prst="rect">
               <a:avLst/>
             </a:prstGeom>
+            <a:solidFill>
+              <a:schemeClr val="accent5">
+                <a:lumMod val="20000"/>
+                <a:lumOff val="80000"/>
+              </a:schemeClr>
+            </a:solidFill>
+            <a:ln>
+              <a:noFill/>
+              <a:headEnd type="none" w="med" len="med"/>
+              <a:tailEnd type="none" w="med" len="med"/>
+            </a:ln>
+            <a:effectLst/>
           </p:spPr>
-        </p:pic>
-        <p:pic>
-          <p:nvPicPr>
-            <p:cNvPr id="5" name="Picture 4"/>
-            <p:cNvPicPr>
-              <a:picLocks noChangeAspect="1"/>
-            </p:cNvPicPr>
-            <p:nvPr/>
-          </p:nvPicPr>
-          <p:blipFill>
-            <a:blip r:embed="rId4">
-              <a:extLst>
-                <a:ext uri="{28A0092B-C50C-407E-A947-70E740481C1C}">
-                  <a14:useLocalDpi xmlns:a14="http://schemas.microsoft.com/office/drawing/2010/main" val="0"/>
-                </a:ext>
-              </a:extLst>
-            </a:blip>
-            <a:stretch>
-              <a:fillRect/>
-            </a:stretch>
-          </p:blipFill>
-          <p:spPr>
-            <a:xfrm>
-              <a:off x="9927910" y="5200855"/>
-              <a:ext cx="1771246" cy="407275"/>
-            </a:xfrm>
-            <a:prstGeom prst="rect">
-              <a:avLst/>
-            </a:prstGeom>
-          </p:spPr>
-        </p:pic>
-        <p:sp>
-          <p:nvSpPr>
-            <p:cNvPr id="6" name="TextBox 5"/>
-            <p:cNvSpPr txBox="1"/>
-            <p:nvPr/>
-          </p:nvSpPr>
-          <p:spPr>
-            <a:xfrm>
-              <a:off x="9726961" y="4387588"/>
-              <a:ext cx="2208138" cy="1050811"/>
-            </a:xfrm>
-            <a:prstGeom prst="rect">
-              <a:avLst/>
-            </a:prstGeom>
-            <a:noFill/>
-          </p:spPr>
+          <p:style>
+            <a:lnRef idx="1">
+              <a:schemeClr val="accent2"/>
+            </a:lnRef>
+            <a:fillRef idx="3">
+              <a:schemeClr val="accent2"/>
+            </a:fillRef>
+            <a:effectRef idx="2">
+              <a:schemeClr val="accent2"/>
+            </a:effectRef>
+            <a:fontRef idx="minor">
+              <a:schemeClr val="lt1"/>
+            </a:fontRef>
+          </p:style>
           <p:txBody>
-            <a:bodyPr wrap="none" lIns="182646" tIns="146117" rIns="182646" bIns="146117" rtlCol="0">
-              <a:spAutoFit/>
+            <a:bodyPr rot="0" spcFirstLastPara="0" vertOverflow="overflow" horzOverflow="overflow" vert="horz" wrap="square" lIns="182880" tIns="146304" rIns="182880" bIns="146304" numCol="1" spcCol="0" rtlCol="0" fromWordArt="0" anchor="t" anchorCtr="0" forceAA="0" compatLnSpc="1">
+              <a:prstTxWarp prst="textNoShape">
+                <a:avLst/>
+              </a:prstTxWarp>
+              <a:noAutofit/>
             </a:bodyPr>
             <a:lstStyle/>
             <a:p>
-              <a:pPr>
+              <a:pPr algn="ctr" defTabSz="932472" fontAlgn="base">
                 <a:lnSpc>
                   <a:spcPct val="90000"/>
                 </a:lnSpc>
+                <a:spcBef>
+                  <a:spcPct val="0"/>
+                </a:spcBef>
                 <a:spcAft>
-                  <a:spcPts val="599"/>
+                  <a:spcPct val="0"/>
                 </a:spcAft>
               </a:pPr>
-              <a:r>
-                <a:rPr lang="en-US" sz="2397" dirty="0">
-                  <a:gradFill>
-                    <a:gsLst>
-                      <a:gs pos="2917">
-                        <a:srgbClr val="FFFFFF"/>
-                      </a:gs>
-                      <a:gs pos="30000">
-                        <a:srgbClr val="FFFFFF"/>
-                      </a:gs>
-                    </a:gsLst>
-                    <a:lin ang="5400000" scaled="0"/>
-                  </a:gradFill>
-                </a:rPr>
-                <a:t>Container OS</a:t>
-              </a:r>
-            </a:p>
-            <a:p>
-              <a:pPr algn="ctr">
-                <a:lnSpc>
-                  <a:spcPct val="90000"/>
-                </a:lnSpc>
-                <a:spcAft>
-                  <a:spcPts val="599"/>
-                </a:spcAft>
-              </a:pPr>
-              <a:r>
-                <a:rPr lang="en-US" sz="2397" dirty="0">
-                  <a:gradFill>
-                    <a:gsLst>
-                      <a:gs pos="2917">
-                        <a:srgbClr val="FFFFFF"/>
-                      </a:gs>
-                      <a:gs pos="30000">
-                        <a:srgbClr val="FFFFFF"/>
-                      </a:gs>
-                    </a:gsLst>
-                    <a:lin ang="5400000" scaled="0"/>
-                  </a:gradFill>
-                </a:rPr>
-                <a:t>Image</a:t>
-              </a:r>
+              <a:endParaRPr lang="en-US" sz="2400" dirty="0" err="1">
+                <a:gradFill>
+                  <a:gsLst>
+                    <a:gs pos="0">
+                      <a:srgbClr val="FFFFFF"/>
+                    </a:gs>
+                    <a:gs pos="100000">
+                      <a:srgbClr val="FFFFFF"/>
+                    </a:gs>
+                  </a:gsLst>
+                  <a:lin ang="5400000" scaled="0"/>
+                </a:gradFill>
+                <a:ea typeface="Segoe UI" pitchFamily="34" charset="0"/>
+                <a:cs typeface="Segoe UI" pitchFamily="34" charset="0"/>
+              </a:endParaRPr>
             </a:p>
           </p:txBody>
         </p:sp>
         <p:grpSp>
           <p:nvGrpSpPr>
-            <p:cNvPr id="17" name="Group 16"/>
+            <p:cNvPr id="21" name="Group 20"/>
             <p:cNvGrpSpPr/>
             <p:nvPr/>
           </p:nvGrpSpPr>
           <p:grpSpPr>
             <a:xfrm>
-              <a:off x="9637979" y="2994171"/>
-              <a:ext cx="2335604" cy="1335432"/>
-              <a:chOff x="9448992" y="2935729"/>
-              <a:chExt cx="2290016" cy="1309366"/>
+              <a:off x="9254523" y="2146690"/>
+              <a:ext cx="2335606" cy="4149261"/>
+              <a:chOff x="9637979" y="1567671"/>
+              <a:chExt cx="2335606" cy="4149261"/>
             </a:xfrm>
           </p:grpSpPr>
           <p:pic>
             <p:nvPicPr>
-              <p:cNvPr id="7" name="Picture 6"/>
-              <p:cNvPicPr>
-                <a:picLocks noChangeAspect="1"/>
-              </p:cNvPicPr>
-              <p:nvPr/>
-            </p:nvPicPr>
-            <p:blipFill>
-              <a:blip r:embed="rId5"/>
-              <a:stretch>
-                <a:fillRect/>
-              </a:stretch>
-            </p:blipFill>
-            <p:spPr>
-              <a:xfrm>
-                <a:off x="9448992" y="2935729"/>
-                <a:ext cx="2290016" cy="1309365"/>
-              </a:xfrm>
-              <a:prstGeom prst="rect">
-                <a:avLst/>
-              </a:prstGeom>
-            </p:spPr>
-          </p:pic>
-          <p:sp>
-            <p:nvSpPr>
-              <p:cNvPr id="8" name="TextBox 7"/>
-              <p:cNvSpPr txBox="1"/>
-              <p:nvPr/>
-            </p:nvSpPr>
-            <p:spPr>
-              <a:xfrm>
-                <a:off x="9733264" y="3317443"/>
-                <a:ext cx="1736673" cy="621342"/>
-              </a:xfrm>
-              <a:prstGeom prst="rect">
-                <a:avLst/>
-              </a:prstGeom>
-              <a:noFill/>
-            </p:spPr>
-            <p:txBody>
-              <a:bodyPr wrap="square" lIns="182646" tIns="146117" rIns="182646" bIns="146117" rtlCol="0">
-                <a:spAutoFit/>
-              </a:bodyPr>
-              <a:lstStyle/>
-              <a:p>
-                <a:pPr algn="ctr">
-                  <a:lnSpc>
-                    <a:spcPct val="90000"/>
-                  </a:lnSpc>
-                  <a:spcAft>
-                    <a:spcPts val="599"/>
-                  </a:spcAft>
-                </a:pPr>
-                <a:r>
-                  <a:rPr lang="en-US" sz="2397" dirty="0">
-                    <a:solidFill>
-                      <a:srgbClr val="0078D7"/>
-                    </a:solidFill>
-                  </a:rPr>
-                  <a:t>Sandbox</a:t>
-                </a:r>
-              </a:p>
-            </p:txBody>
-          </p:sp>
-          <p:pic>
-            <p:nvPicPr>
-              <p:cNvPr id="9" name="Picture 8"/>
+              <p:cNvPr id="4" name="Picture 3"/>
               <p:cNvPicPr>
                 <a:picLocks noChangeAspect="1"/>
               </p:cNvPicPr>
@@ -36727,8 +34972,38 @@
             </p:blipFill>
             <p:spPr>
               <a:xfrm>
-                <a:off x="9456073" y="2941700"/>
-                <a:ext cx="2274818" cy="1303395"/>
+                <a:off x="9653481" y="4387590"/>
+                <a:ext cx="2320104" cy="1329342"/>
+              </a:xfrm>
+              <a:prstGeom prst="rect">
+                <a:avLst/>
+              </a:prstGeom>
+            </p:spPr>
+          </p:pic>
+          <p:pic>
+            <p:nvPicPr>
+              <p:cNvPr id="5" name="Picture 4"/>
+              <p:cNvPicPr>
+                <a:picLocks noChangeAspect="1"/>
+              </p:cNvPicPr>
+              <p:nvPr/>
+            </p:nvPicPr>
+            <p:blipFill>
+              <a:blip r:embed="rId4">
+                <a:extLst>
+                  <a:ext uri="{28A0092B-C50C-407E-A947-70E740481C1C}">
+                    <a14:useLocalDpi xmlns:a14="http://schemas.microsoft.com/office/drawing/2010/main" val="0"/>
+                  </a:ext>
+                </a:extLst>
+              </a:blip>
+              <a:stretch>
+                <a:fillRect/>
+              </a:stretch>
+            </p:blipFill>
+            <p:spPr>
+              <a:xfrm>
+                <a:off x="9927910" y="5200855"/>
+                <a:ext cx="1771246" cy="407275"/>
               </a:xfrm>
               <a:prstGeom prst="rect">
                 <a:avLst/>
@@ -36737,14 +35012,14 @@
           </p:pic>
           <p:sp>
             <p:nvSpPr>
-              <p:cNvPr id="10" name="TextBox 9"/>
+              <p:cNvPr id="6" name="TextBox 5"/>
               <p:cNvSpPr txBox="1"/>
               <p:nvPr/>
             </p:nvSpPr>
             <p:spPr>
               <a:xfrm>
-                <a:off x="9603522" y="2961952"/>
-                <a:ext cx="2032759" cy="621342"/>
+                <a:off x="9726961" y="4387588"/>
+                <a:ext cx="2208138" cy="1050811"/>
               </a:xfrm>
               <a:prstGeom prst="rect">
                 <a:avLst/>
@@ -36757,7 +35032,7 @@
               </a:bodyPr>
               <a:lstStyle/>
               <a:p>
-                <a:pPr algn="ctr">
+                <a:pPr>
                   <a:lnSpc>
                     <a:spcPct val="90000"/>
                   </a:lnSpc>
@@ -36765,22 +35040,6 @@
                     <a:spcPts val="599"/>
                   </a:spcAft>
                 </a:pPr>
-                <a:r>
-                  <a:rPr lang="en-US" sz="2397" dirty="0" err="1">
-                    <a:gradFill>
-                      <a:gsLst>
-                        <a:gs pos="2917">
-                          <a:srgbClr val="FFFFFF"/>
-                        </a:gs>
-                        <a:gs pos="30000">
-                          <a:srgbClr val="FFFFFF"/>
-                        </a:gs>
-                      </a:gsLst>
-                      <a:lin ang="5400000" scaled="0"/>
-                    </a:gradFill>
-                  </a:rPr>
-                  <a:t>microsoft</a:t>
-                </a:r>
                 <a:r>
                   <a:rPr lang="en-US" sz="2397" dirty="0">
                     <a:gradFill>
@@ -36795,205 +35054,9 @@
                       <a:lin ang="5400000" scaled="0"/>
                     </a:gradFill>
                   </a:rPr>
-                  <a:t>/</a:t>
-                </a:r>
-                <a:r>
-                  <a:rPr lang="en-US" sz="2397" dirty="0" err="1">
-                    <a:gradFill>
-                      <a:gsLst>
-                        <a:gs pos="2917">
-                          <a:srgbClr val="FFFFFF"/>
-                        </a:gs>
-                        <a:gs pos="30000">
-                          <a:srgbClr val="FFFFFF"/>
-                        </a:gs>
-                      </a:gsLst>
-                      <a:lin ang="5400000" scaled="0"/>
-                    </a:gradFill>
-                  </a:rPr>
-                  <a:t>iis</a:t>
-                </a:r>
-                <a:endParaRPr lang="en-US" sz="2397" dirty="0">
-                  <a:gradFill>
-                    <a:gsLst>
-                      <a:gs pos="2917">
-                        <a:srgbClr val="FFFFFF"/>
-                      </a:gs>
-                      <a:gs pos="30000">
-                        <a:srgbClr val="FFFFFF"/>
-                      </a:gs>
-                    </a:gsLst>
-                    <a:lin ang="5400000" scaled="0"/>
-                  </a:gradFill>
-                </a:endParaRPr>
-              </a:p>
-            </p:txBody>
-          </p:sp>
-          <p:sp>
-            <p:nvSpPr>
-              <p:cNvPr id="11" name="Rectangle 10"/>
-              <p:cNvSpPr/>
-              <p:nvPr/>
-            </p:nvSpPr>
-            <p:spPr bwMode="auto">
-              <a:xfrm>
-                <a:off x="9856872" y="3558517"/>
-                <a:ext cx="1482848" cy="423074"/>
-              </a:xfrm>
-              <a:prstGeom prst="rect">
-                <a:avLst/>
-              </a:prstGeom>
-              <a:noFill/>
-              <a:ln w="38100">
-                <a:solidFill>
-                  <a:schemeClr val="bg1"/>
-                </a:solidFill>
-                <a:headEnd type="none" w="med" len="med"/>
-                <a:tailEnd type="none" w="med" len="med"/>
-              </a:ln>
-            </p:spPr>
-            <p:style>
-              <a:lnRef idx="2">
-                <a:schemeClr val="accent1"/>
-              </a:lnRef>
-              <a:fillRef idx="1">
-                <a:schemeClr val="lt1"/>
-              </a:fillRef>
-              <a:effectRef idx="0">
-                <a:schemeClr val="accent1"/>
-              </a:effectRef>
-              <a:fontRef idx="minor">
-                <a:schemeClr val="dk1"/>
-              </a:fontRef>
-            </p:style>
-            <p:txBody>
-              <a:bodyPr vert="horz" wrap="square" lIns="0" tIns="46577" rIns="0" bIns="46577" numCol="1" rtlCol="0" anchor="ctr" anchorCtr="0" compatLnSpc="1">
-                <a:prstTxWarp prst="textNoShape">
-                  <a:avLst/>
-                </a:prstTxWarp>
-              </a:bodyPr>
-              <a:lstStyle/>
-              <a:p>
-                <a:pPr algn="ctr" defTabSz="931193" fontAlgn="base">
-                  <a:spcBef>
-                    <a:spcPct val="0"/>
-                  </a:spcBef>
-                  <a:spcAft>
-                    <a:spcPct val="0"/>
-                  </a:spcAft>
-                </a:pPr>
-                <a:r>
-                  <a:rPr lang="en-US" sz="1798" dirty="0">
-                    <a:solidFill>
-                      <a:schemeClr val="bg1"/>
-                    </a:solidFill>
-                  </a:rPr>
-                  <a:t>Layer 1</a:t>
+                  <a:t>Container OS</a:t>
                 </a:r>
               </a:p>
-            </p:txBody>
-          </p:sp>
-        </p:grpSp>
-        <p:grpSp>
-          <p:nvGrpSpPr>
-            <p:cNvPr id="18" name="Group 17"/>
-            <p:cNvGrpSpPr/>
-            <p:nvPr/>
-          </p:nvGrpSpPr>
-          <p:grpSpPr>
-            <a:xfrm>
-              <a:off x="9646753" y="1567671"/>
-              <a:ext cx="2320104" cy="1329342"/>
-              <a:chOff x="9457595" y="1537072"/>
-              <a:chExt cx="2274818" cy="1303395"/>
-            </a:xfrm>
-          </p:grpSpPr>
-          <p:sp>
-            <p:nvSpPr>
-              <p:cNvPr id="12" name="TextBox 11"/>
-              <p:cNvSpPr txBox="1"/>
-              <p:nvPr/>
-            </p:nvSpPr>
-            <p:spPr>
-              <a:xfrm>
-                <a:off x="9740343" y="1957194"/>
-                <a:ext cx="1736673" cy="621342"/>
-              </a:xfrm>
-              <a:prstGeom prst="rect">
-                <a:avLst/>
-              </a:prstGeom>
-              <a:noFill/>
-            </p:spPr>
-            <p:txBody>
-              <a:bodyPr wrap="square" lIns="182646" tIns="146117" rIns="182646" bIns="146117" rtlCol="0">
-                <a:spAutoFit/>
-              </a:bodyPr>
-              <a:lstStyle/>
-              <a:p>
-                <a:pPr algn="ctr">
-                  <a:lnSpc>
-                    <a:spcPct val="90000"/>
-                  </a:lnSpc>
-                  <a:spcAft>
-                    <a:spcPts val="599"/>
-                  </a:spcAft>
-                </a:pPr>
-                <a:r>
-                  <a:rPr lang="en-US" sz="2397" dirty="0">
-                    <a:solidFill>
-                      <a:srgbClr val="0078D7"/>
-                    </a:solidFill>
-                  </a:rPr>
-                  <a:t>Sandbox</a:t>
-                </a:r>
-              </a:p>
-            </p:txBody>
-          </p:sp>
-          <p:pic>
-            <p:nvPicPr>
-              <p:cNvPr id="13" name="Picture 12"/>
-              <p:cNvPicPr>
-                <a:picLocks noChangeAspect="1"/>
-              </p:cNvPicPr>
-              <p:nvPr/>
-            </p:nvPicPr>
-            <p:blipFill>
-              <a:blip r:embed="rId3"/>
-              <a:stretch>
-                <a:fillRect/>
-              </a:stretch>
-            </p:blipFill>
-            <p:spPr>
-              <a:xfrm>
-                <a:off x="9457595" y="1537072"/>
-                <a:ext cx="2274818" cy="1303395"/>
-              </a:xfrm>
-              <a:prstGeom prst="rect">
-                <a:avLst/>
-              </a:prstGeom>
-            </p:spPr>
-          </p:pic>
-          <p:sp>
-            <p:nvSpPr>
-              <p:cNvPr id="14" name="TextBox 13"/>
-              <p:cNvSpPr txBox="1"/>
-              <p:nvPr/>
-            </p:nvSpPr>
-            <p:spPr>
-              <a:xfrm>
-                <a:off x="9575718" y="1682593"/>
-                <a:ext cx="1936643" cy="621342"/>
-              </a:xfrm>
-              <a:prstGeom prst="rect">
-                <a:avLst/>
-              </a:prstGeom>
-              <a:noFill/>
-            </p:spPr>
-            <p:txBody>
-              <a:bodyPr wrap="none" lIns="182646" tIns="146117" rIns="182646" bIns="146117" rtlCol="0">
-                <a:spAutoFit/>
-              </a:bodyPr>
-              <a:lstStyle/>
               <a:p>
                 <a:pPr algn="ctr">
                   <a:lnSpc>
@@ -37017,75 +35080,466 @@
                       <a:lin ang="5400000" scaled="0"/>
                     </a:gradFill>
                   </a:rPr>
-                  <a:t>Mysite.html</a:t>
+                  <a:t>Image</a:t>
                 </a:r>
               </a:p>
             </p:txBody>
           </p:sp>
-          <p:sp>
-            <p:nvSpPr>
-              <p:cNvPr id="15" name="Rectangle 14"/>
-              <p:cNvSpPr/>
+          <p:grpSp>
+            <p:nvGrpSpPr>
+              <p:cNvPr id="17" name="Group 16"/>
+              <p:cNvGrpSpPr/>
               <p:nvPr/>
-            </p:nvSpPr>
-            <p:spPr bwMode="auto">
+            </p:nvGrpSpPr>
+            <p:grpSpPr>
               <a:xfrm>
-                <a:off x="9852055" y="2199827"/>
-                <a:ext cx="1482848" cy="423074"/>
+                <a:off x="9637979" y="2994171"/>
+                <a:ext cx="2335604" cy="1335432"/>
+                <a:chOff x="9448992" y="2935729"/>
+                <a:chExt cx="2290016" cy="1309366"/>
               </a:xfrm>
-              <a:prstGeom prst="rect">
-                <a:avLst/>
-              </a:prstGeom>
-              <a:noFill/>
-              <a:ln w="38100">
-                <a:solidFill>
-                  <a:schemeClr val="bg1"/>
-                </a:solidFill>
-                <a:headEnd type="none" w="med" len="med"/>
-                <a:tailEnd type="none" w="med" len="med"/>
-              </a:ln>
-            </p:spPr>
-            <p:style>
-              <a:lnRef idx="2">
-                <a:schemeClr val="accent1"/>
-              </a:lnRef>
-              <a:fillRef idx="1">
-                <a:schemeClr val="lt1"/>
-              </a:fillRef>
-              <a:effectRef idx="0">
-                <a:schemeClr val="accent1"/>
-              </a:effectRef>
-              <a:fontRef idx="minor">
-                <a:schemeClr val="dk1"/>
-              </a:fontRef>
-            </p:style>
-            <p:txBody>
-              <a:bodyPr vert="horz" wrap="square" lIns="0" tIns="46577" rIns="0" bIns="46577" numCol="1" rtlCol="0" anchor="ctr" anchorCtr="0" compatLnSpc="1">
-                <a:prstTxWarp prst="textNoShape">
+            </p:grpSpPr>
+            <p:pic>
+              <p:nvPicPr>
+                <p:cNvPr id="7" name="Picture 6"/>
+                <p:cNvPicPr>
+                  <a:picLocks noChangeAspect="1"/>
+                </p:cNvPicPr>
+                <p:nvPr/>
+              </p:nvPicPr>
+              <p:blipFill>
+                <a:blip r:embed="rId5"/>
+                <a:stretch>
+                  <a:fillRect/>
+                </a:stretch>
+              </p:blipFill>
+              <p:spPr>
+                <a:xfrm>
+                  <a:off x="9448992" y="2935729"/>
+                  <a:ext cx="2290016" cy="1309365"/>
+                </a:xfrm>
+                <a:prstGeom prst="rect">
                   <a:avLst/>
-                </a:prstTxWarp>
-              </a:bodyPr>
-              <a:lstStyle/>
-              <a:p>
-                <a:pPr algn="ctr" defTabSz="931193" fontAlgn="base">
-                  <a:spcBef>
-                    <a:spcPct val="0"/>
-                  </a:spcBef>
-                  <a:spcAft>
-                    <a:spcPct val="0"/>
-                  </a:spcAft>
-                </a:pPr>
-                <a:r>
-                  <a:rPr lang="en-US" sz="1798" dirty="0">
-                    <a:solidFill>
-                      <a:schemeClr val="bg1"/>
-                    </a:solidFill>
-                  </a:rPr>
-                  <a:t>Layer 2</a:t>
-                </a:r>
-              </a:p>
-            </p:txBody>
-          </p:sp>
+                </a:prstGeom>
+              </p:spPr>
+            </p:pic>
+            <p:sp>
+              <p:nvSpPr>
+                <p:cNvPr id="8" name="TextBox 7"/>
+                <p:cNvSpPr txBox="1"/>
+                <p:nvPr/>
+              </p:nvSpPr>
+              <p:spPr>
+                <a:xfrm>
+                  <a:off x="9733264" y="3317443"/>
+                  <a:ext cx="1736673" cy="621342"/>
+                </a:xfrm>
+                <a:prstGeom prst="rect">
+                  <a:avLst/>
+                </a:prstGeom>
+                <a:noFill/>
+              </p:spPr>
+              <p:txBody>
+                <a:bodyPr wrap="square" lIns="182646" tIns="146117" rIns="182646" bIns="146117" rtlCol="0">
+                  <a:spAutoFit/>
+                </a:bodyPr>
+                <a:lstStyle/>
+                <a:p>
+                  <a:pPr algn="ctr">
+                    <a:lnSpc>
+                      <a:spcPct val="90000"/>
+                    </a:lnSpc>
+                    <a:spcAft>
+                      <a:spcPts val="599"/>
+                    </a:spcAft>
+                  </a:pPr>
+                  <a:r>
+                    <a:rPr lang="en-US" sz="2397" dirty="0">
+                      <a:solidFill>
+                        <a:srgbClr val="0078D7"/>
+                      </a:solidFill>
+                    </a:rPr>
+                    <a:t>Sandbox</a:t>
+                  </a:r>
+                </a:p>
+              </p:txBody>
+            </p:sp>
+            <p:pic>
+              <p:nvPicPr>
+                <p:cNvPr id="9" name="Picture 8"/>
+                <p:cNvPicPr>
+                  <a:picLocks noChangeAspect="1"/>
+                </p:cNvPicPr>
+                <p:nvPr/>
+              </p:nvPicPr>
+              <p:blipFill>
+                <a:blip r:embed="rId3"/>
+                <a:stretch>
+                  <a:fillRect/>
+                </a:stretch>
+              </p:blipFill>
+              <p:spPr>
+                <a:xfrm>
+                  <a:off x="9456073" y="2941700"/>
+                  <a:ext cx="2274818" cy="1303395"/>
+                </a:xfrm>
+                <a:prstGeom prst="rect">
+                  <a:avLst/>
+                </a:prstGeom>
+              </p:spPr>
+            </p:pic>
+            <p:sp>
+              <p:nvSpPr>
+                <p:cNvPr id="10" name="TextBox 9"/>
+                <p:cNvSpPr txBox="1"/>
+                <p:nvPr/>
+              </p:nvSpPr>
+              <p:spPr>
+                <a:xfrm>
+                  <a:off x="9603522" y="2961952"/>
+                  <a:ext cx="2032759" cy="621342"/>
+                </a:xfrm>
+                <a:prstGeom prst="rect">
+                  <a:avLst/>
+                </a:prstGeom>
+                <a:noFill/>
+              </p:spPr>
+              <p:txBody>
+                <a:bodyPr wrap="none" lIns="182646" tIns="146117" rIns="182646" bIns="146117" rtlCol="0">
+                  <a:spAutoFit/>
+                </a:bodyPr>
+                <a:lstStyle/>
+                <a:p>
+                  <a:pPr algn="ctr">
+                    <a:lnSpc>
+                      <a:spcPct val="90000"/>
+                    </a:lnSpc>
+                    <a:spcAft>
+                      <a:spcPts val="599"/>
+                    </a:spcAft>
+                  </a:pPr>
+                  <a:r>
+                    <a:rPr lang="en-US" sz="2397" dirty="0" err="1">
+                      <a:gradFill>
+                        <a:gsLst>
+                          <a:gs pos="2917">
+                            <a:srgbClr val="FFFFFF"/>
+                          </a:gs>
+                          <a:gs pos="30000">
+                            <a:srgbClr val="FFFFFF"/>
+                          </a:gs>
+                        </a:gsLst>
+                        <a:lin ang="5400000" scaled="0"/>
+                      </a:gradFill>
+                    </a:rPr>
+                    <a:t>microsoft</a:t>
+                  </a:r>
+                  <a:r>
+                    <a:rPr lang="en-US" sz="2397" dirty="0">
+                      <a:gradFill>
+                        <a:gsLst>
+                          <a:gs pos="2917">
+                            <a:srgbClr val="FFFFFF"/>
+                          </a:gs>
+                          <a:gs pos="30000">
+                            <a:srgbClr val="FFFFFF"/>
+                          </a:gs>
+                        </a:gsLst>
+                        <a:lin ang="5400000" scaled="0"/>
+                      </a:gradFill>
+                    </a:rPr>
+                    <a:t>/</a:t>
+                  </a:r>
+                  <a:r>
+                    <a:rPr lang="en-US" sz="2397" dirty="0" err="1">
+                      <a:gradFill>
+                        <a:gsLst>
+                          <a:gs pos="2917">
+                            <a:srgbClr val="FFFFFF"/>
+                          </a:gs>
+                          <a:gs pos="30000">
+                            <a:srgbClr val="FFFFFF"/>
+                          </a:gs>
+                        </a:gsLst>
+                        <a:lin ang="5400000" scaled="0"/>
+                      </a:gradFill>
+                    </a:rPr>
+                    <a:t>iis</a:t>
+                  </a:r>
+                  <a:endParaRPr lang="en-US" sz="2397" dirty="0">
+                    <a:gradFill>
+                      <a:gsLst>
+                        <a:gs pos="2917">
+                          <a:srgbClr val="FFFFFF"/>
+                        </a:gs>
+                        <a:gs pos="30000">
+                          <a:srgbClr val="FFFFFF"/>
+                        </a:gs>
+                      </a:gsLst>
+                      <a:lin ang="5400000" scaled="0"/>
+                    </a:gradFill>
+                  </a:endParaRPr>
+                </a:p>
+              </p:txBody>
+            </p:sp>
+            <p:sp>
+              <p:nvSpPr>
+                <p:cNvPr id="11" name="Rectangle 10"/>
+                <p:cNvSpPr/>
+                <p:nvPr/>
+              </p:nvSpPr>
+              <p:spPr bwMode="auto">
+                <a:xfrm>
+                  <a:off x="9856872" y="3558517"/>
+                  <a:ext cx="1482848" cy="423074"/>
+                </a:xfrm>
+                <a:prstGeom prst="rect">
+                  <a:avLst/>
+                </a:prstGeom>
+                <a:noFill/>
+                <a:ln w="38100">
+                  <a:solidFill>
+                    <a:schemeClr val="bg1"/>
+                  </a:solidFill>
+                  <a:headEnd type="none" w="med" len="med"/>
+                  <a:tailEnd type="none" w="med" len="med"/>
+                </a:ln>
+              </p:spPr>
+              <p:style>
+                <a:lnRef idx="2">
+                  <a:schemeClr val="accent1"/>
+                </a:lnRef>
+                <a:fillRef idx="1">
+                  <a:schemeClr val="lt1"/>
+                </a:fillRef>
+                <a:effectRef idx="0">
+                  <a:schemeClr val="accent1"/>
+                </a:effectRef>
+                <a:fontRef idx="minor">
+                  <a:schemeClr val="dk1"/>
+                </a:fontRef>
+              </p:style>
+              <p:txBody>
+                <a:bodyPr vert="horz" wrap="square" lIns="0" tIns="46577" rIns="0" bIns="46577" numCol="1" rtlCol="0" anchor="ctr" anchorCtr="0" compatLnSpc="1">
+                  <a:prstTxWarp prst="textNoShape">
+                    <a:avLst/>
+                  </a:prstTxWarp>
+                </a:bodyPr>
+                <a:lstStyle/>
+                <a:p>
+                  <a:pPr algn="ctr" defTabSz="931193" fontAlgn="base">
+                    <a:spcBef>
+                      <a:spcPct val="0"/>
+                    </a:spcBef>
+                    <a:spcAft>
+                      <a:spcPct val="0"/>
+                    </a:spcAft>
+                  </a:pPr>
+                  <a:r>
+                    <a:rPr lang="en-US" sz="1798" dirty="0">
+                      <a:solidFill>
+                        <a:schemeClr val="bg1"/>
+                      </a:solidFill>
+                    </a:rPr>
+                    <a:t>Layer 1</a:t>
+                  </a:r>
+                </a:p>
+              </p:txBody>
+            </p:sp>
+          </p:grpSp>
+          <p:grpSp>
+            <p:nvGrpSpPr>
+              <p:cNvPr id="18" name="Group 17"/>
+              <p:cNvGrpSpPr/>
+              <p:nvPr/>
+            </p:nvGrpSpPr>
+            <p:grpSpPr>
+              <a:xfrm>
+                <a:off x="9646753" y="1567671"/>
+                <a:ext cx="2320104" cy="1329342"/>
+                <a:chOff x="9457595" y="1537072"/>
+                <a:chExt cx="2274818" cy="1303395"/>
+              </a:xfrm>
+            </p:grpSpPr>
+            <p:sp>
+              <p:nvSpPr>
+                <p:cNvPr id="12" name="TextBox 11"/>
+                <p:cNvSpPr txBox="1"/>
+                <p:nvPr/>
+              </p:nvSpPr>
+              <p:spPr>
+                <a:xfrm>
+                  <a:off x="9740343" y="1957194"/>
+                  <a:ext cx="1736673" cy="621342"/>
+                </a:xfrm>
+                <a:prstGeom prst="rect">
+                  <a:avLst/>
+                </a:prstGeom>
+                <a:noFill/>
+              </p:spPr>
+              <p:txBody>
+                <a:bodyPr wrap="square" lIns="182646" tIns="146117" rIns="182646" bIns="146117" rtlCol="0">
+                  <a:spAutoFit/>
+                </a:bodyPr>
+                <a:lstStyle/>
+                <a:p>
+                  <a:pPr algn="ctr">
+                    <a:lnSpc>
+                      <a:spcPct val="90000"/>
+                    </a:lnSpc>
+                    <a:spcAft>
+                      <a:spcPts val="599"/>
+                    </a:spcAft>
+                  </a:pPr>
+                  <a:r>
+                    <a:rPr lang="en-US" sz="2397" dirty="0">
+                      <a:solidFill>
+                        <a:srgbClr val="0078D7"/>
+                      </a:solidFill>
+                    </a:rPr>
+                    <a:t>Sandbox</a:t>
+                  </a:r>
+                </a:p>
+              </p:txBody>
+            </p:sp>
+            <p:pic>
+              <p:nvPicPr>
+                <p:cNvPr id="13" name="Picture 12"/>
+                <p:cNvPicPr>
+                  <a:picLocks noChangeAspect="1"/>
+                </p:cNvPicPr>
+                <p:nvPr/>
+              </p:nvPicPr>
+              <p:blipFill>
+                <a:blip r:embed="rId3"/>
+                <a:stretch>
+                  <a:fillRect/>
+                </a:stretch>
+              </p:blipFill>
+              <p:spPr>
+                <a:xfrm>
+                  <a:off x="9457595" y="1537072"/>
+                  <a:ext cx="2274818" cy="1303395"/>
+                </a:xfrm>
+                <a:prstGeom prst="rect">
+                  <a:avLst/>
+                </a:prstGeom>
+              </p:spPr>
+            </p:pic>
+            <p:sp>
+              <p:nvSpPr>
+                <p:cNvPr id="14" name="TextBox 13"/>
+                <p:cNvSpPr txBox="1"/>
+                <p:nvPr/>
+              </p:nvSpPr>
+              <p:spPr>
+                <a:xfrm>
+                  <a:off x="9575718" y="1682593"/>
+                  <a:ext cx="1936643" cy="621342"/>
+                </a:xfrm>
+                <a:prstGeom prst="rect">
+                  <a:avLst/>
+                </a:prstGeom>
+                <a:noFill/>
+              </p:spPr>
+              <p:txBody>
+                <a:bodyPr wrap="none" lIns="182646" tIns="146117" rIns="182646" bIns="146117" rtlCol="0">
+                  <a:spAutoFit/>
+                </a:bodyPr>
+                <a:lstStyle/>
+                <a:p>
+                  <a:pPr algn="ctr">
+                    <a:lnSpc>
+                      <a:spcPct val="90000"/>
+                    </a:lnSpc>
+                    <a:spcAft>
+                      <a:spcPts val="599"/>
+                    </a:spcAft>
+                  </a:pPr>
+                  <a:r>
+                    <a:rPr lang="en-US" sz="2397" dirty="0">
+                      <a:gradFill>
+                        <a:gsLst>
+                          <a:gs pos="2917">
+                            <a:srgbClr val="FFFFFF"/>
+                          </a:gs>
+                          <a:gs pos="30000">
+                            <a:srgbClr val="FFFFFF"/>
+                          </a:gs>
+                        </a:gsLst>
+                        <a:lin ang="5400000" scaled="0"/>
+                      </a:gradFill>
+                    </a:rPr>
+                    <a:t>Mysite.html</a:t>
+                  </a:r>
+                </a:p>
+              </p:txBody>
+            </p:sp>
+            <p:sp>
+              <p:nvSpPr>
+                <p:cNvPr id="15" name="Rectangle 14"/>
+                <p:cNvSpPr/>
+                <p:nvPr/>
+              </p:nvSpPr>
+              <p:spPr bwMode="auto">
+                <a:xfrm>
+                  <a:off x="9852055" y="2199827"/>
+                  <a:ext cx="1482848" cy="423074"/>
+                </a:xfrm>
+                <a:prstGeom prst="rect">
+                  <a:avLst/>
+                </a:prstGeom>
+                <a:noFill/>
+                <a:ln w="38100">
+                  <a:solidFill>
+                    <a:schemeClr val="bg1"/>
+                  </a:solidFill>
+                  <a:headEnd type="none" w="med" len="med"/>
+                  <a:tailEnd type="none" w="med" len="med"/>
+                </a:ln>
+              </p:spPr>
+              <p:style>
+                <a:lnRef idx="2">
+                  <a:schemeClr val="accent1"/>
+                </a:lnRef>
+                <a:fillRef idx="1">
+                  <a:schemeClr val="lt1"/>
+                </a:fillRef>
+                <a:effectRef idx="0">
+                  <a:schemeClr val="accent1"/>
+                </a:effectRef>
+                <a:fontRef idx="minor">
+                  <a:schemeClr val="dk1"/>
+                </a:fontRef>
+              </p:style>
+              <p:txBody>
+                <a:bodyPr vert="horz" wrap="square" lIns="0" tIns="46577" rIns="0" bIns="46577" numCol="1" rtlCol="0" anchor="ctr" anchorCtr="0" compatLnSpc="1">
+                  <a:prstTxWarp prst="textNoShape">
+                    <a:avLst/>
+                  </a:prstTxWarp>
+                </a:bodyPr>
+                <a:lstStyle/>
+                <a:p>
+                  <a:pPr algn="ctr" defTabSz="931193" fontAlgn="base">
+                    <a:spcBef>
+                      <a:spcPct val="0"/>
+                    </a:spcBef>
+                    <a:spcAft>
+                      <a:spcPct val="0"/>
+                    </a:spcAft>
+                  </a:pPr>
+                  <a:r>
+                    <a:rPr lang="en-US" sz="1798" dirty="0">
+                      <a:solidFill>
+                        <a:schemeClr val="bg1"/>
+                      </a:solidFill>
+                    </a:rPr>
+                    <a:t>Layer 2</a:t>
+                  </a:r>
+                </a:p>
+              </p:txBody>
+            </p:sp>
+          </p:grpSp>
         </p:grpSp>
       </p:grpSp>
       <p:sp>
@@ -37231,7 +35685,7 @@
                                         <p:tgtEl>
                                           <p:spTgt spid="3">
                                             <p:txEl>
-                                              <p:pRg st="1" end="1"/>
+                                              <p:pRg st="2" end="2"/>
                                             </p:txEl>
                                           </p:spTgt>
                                         </p:tgtEl>
@@ -37249,7 +35703,7 @@
                                         <p:tgtEl>
                                           <p:spTgt spid="3">
                                             <p:txEl>
-                                              <p:pRg st="1" end="1"/>
+                                              <p:pRg st="2" end="2"/>
                                             </p:txEl>
                                           </p:spTgt>
                                         </p:tgtEl>
@@ -37292,7 +35746,7 @@
                                         <p:tgtEl>
                                           <p:spTgt spid="3">
                                             <p:txEl>
-                                              <p:pRg st="2" end="2"/>
+                                              <p:pRg st="4" end="4"/>
                                             </p:txEl>
                                           </p:spTgt>
                                         </p:tgtEl>
@@ -37310,7 +35764,7 @@
                                         <p:tgtEl>
                                           <p:spTgt spid="3">
                                             <p:txEl>
-                                              <p:pRg st="2" end="2"/>
+                                              <p:pRg st="4" end="4"/>
                                             </p:txEl>
                                           </p:spTgt>
                                         </p:tgtEl>
@@ -37353,7 +35807,7 @@
                                         <p:tgtEl>
                                           <p:spTgt spid="3">
                                             <p:txEl>
-                                              <p:pRg st="3" end="3"/>
+                                              <p:pRg st="6" end="6"/>
                                             </p:txEl>
                                           </p:spTgt>
                                         </p:tgtEl>
@@ -37371,12 +35825,57 @@
                                         <p:tgtEl>
                                           <p:spTgt spid="3">
                                             <p:txEl>
-                                              <p:pRg st="3" end="3"/>
+                                              <p:pRg st="6" end="6"/>
                                             </p:txEl>
                                           </p:spTgt>
                                         </p:tgtEl>
                                       </p:cBhvr>
                                     </p:animEffect>
+                                  </p:childTnLst>
+                                </p:cTn>
+                              </p:par>
+                            </p:childTnLst>
+                          </p:cTn>
+                        </p:par>
+                      </p:childTnLst>
+                    </p:cTn>
+                  </p:par>
+                  <p:par>
+                    <p:cTn id="23" fill="hold">
+                      <p:stCondLst>
+                        <p:cond delay="indefinite"/>
+                      </p:stCondLst>
+                      <p:childTnLst>
+                        <p:par>
+                          <p:cTn id="24" fill="hold">
+                            <p:stCondLst>
+                              <p:cond delay="0"/>
+                            </p:stCondLst>
+                            <p:childTnLst>
+                              <p:par>
+                                <p:cTn id="25" presetID="1" presetClass="entr" presetSubtype="0" fill="hold" nodeType="clickEffect">
+                                  <p:stCondLst>
+                                    <p:cond delay="0"/>
+                                  </p:stCondLst>
+                                  <p:childTnLst>
+                                    <p:set>
+                                      <p:cBhvr>
+                                        <p:cTn id="26" dur="1" fill="hold">
+                                          <p:stCondLst>
+                                            <p:cond delay="0"/>
+                                          </p:stCondLst>
+                                        </p:cTn>
+                                        <p:tgtEl>
+                                          <p:spTgt spid="19"/>
+                                        </p:tgtEl>
+                                        <p:attrNameLst>
+                                          <p:attrName>style.visibility</p:attrName>
+                                        </p:attrNameLst>
+                                      </p:cBhvr>
+                                      <p:to>
+                                        <p:strVal val="visible"/>
+                                      </p:to>
+                                    </p:set>
                                   </p:childTnLst>
                                 </p:cTn>
                               </p:par>
@@ -38205,10 +36704,10 @@
         </p:nvGrpSpPr>
         <p:grpSpPr>
           <a:xfrm>
-            <a:off x="3398837" y="4092320"/>
-            <a:ext cx="2667000" cy="2470667"/>
+            <a:off x="1417637" y="3954462"/>
+            <a:ext cx="3622902" cy="2428220"/>
             <a:chOff x="4389437" y="3978388"/>
-            <a:chExt cx="2667000" cy="2470667"/>
+            <a:chExt cx="3622902" cy="2428220"/>
           </a:xfrm>
         </p:grpSpPr>
         <p:pic>
@@ -38260,8 +36759,8 @@
           </p:nvSpPr>
           <p:spPr>
             <a:xfrm>
-              <a:off x="4634124" y="6079723"/>
-              <a:ext cx="2293577" cy="369332"/>
+              <a:off x="4541837" y="5883388"/>
+              <a:ext cx="3470502" cy="523220"/>
             </a:xfrm>
             <a:prstGeom prst="rect">
               <a:avLst/>
@@ -38274,12 +36773,12 @@
             <a:lstStyle/>
             <a:p>
               <a:r>
-                <a:rPr lang="en-US" dirty="0">
+                <a:rPr lang="en-US" sz="2800" dirty="0">
                   <a:hlinkClick r:id="rId4"/>
                 </a:rPr>
                 <a:t>http://kubernetes.io/</a:t>
               </a:r>
-              <a:endParaRPr lang="en-US" dirty="0"/>
+              <a:endParaRPr lang="en-US" sz="2800" dirty="0"/>
             </a:p>
           </p:txBody>
         </p:sp>
@@ -38292,10 +36791,10 @@
         </p:nvGrpSpPr>
         <p:grpSpPr>
           <a:xfrm>
-            <a:off x="1570037" y="1676546"/>
-            <a:ext cx="3364706" cy="2021387"/>
-            <a:chOff x="1570037" y="1676546"/>
-            <a:chExt cx="3364706" cy="2021387"/>
+            <a:off x="644711" y="1439862"/>
+            <a:ext cx="4177810" cy="2001780"/>
+            <a:chOff x="1550312" y="1676546"/>
+            <a:chExt cx="4177810" cy="2001780"/>
           </a:xfrm>
         </p:grpSpPr>
         <p:pic>
@@ -38330,8 +36829,8 @@
           </p:nvSpPr>
           <p:spPr>
             <a:xfrm>
-              <a:off x="1870923" y="3328601"/>
-              <a:ext cx="2748060" cy="369332"/>
+              <a:off x="1550312" y="3155106"/>
+              <a:ext cx="4177810" cy="523220"/>
             </a:xfrm>
             <a:prstGeom prst="rect">
               <a:avLst/>
@@ -38344,12 +36843,12 @@
             <a:lstStyle/>
             <a:p>
               <a:r>
-                <a:rPr lang="en-US" dirty="0">
+                <a:rPr lang="en-US" sz="2800" dirty="0">
                   <a:hlinkClick r:id="rId6"/>
                 </a:rPr>
                 <a:t>https://mesosphere.com/</a:t>
               </a:r>
-              <a:endParaRPr lang="en-US" dirty="0"/>
+              <a:endParaRPr lang="en-US" sz="2800" dirty="0"/>
             </a:p>
           </p:txBody>
         </p:sp>
@@ -38362,10 +36861,10 @@
         </p:nvGrpSpPr>
         <p:grpSpPr>
           <a:xfrm>
-            <a:off x="6946306" y="1897062"/>
-            <a:ext cx="5153911" cy="2662221"/>
+            <a:off x="4522321" y="2430462"/>
+            <a:ext cx="7914154" cy="2816109"/>
             <a:chOff x="6751637" y="551965"/>
-            <a:chExt cx="5153911" cy="2662221"/>
+            <a:chExt cx="7914154" cy="2816109"/>
           </a:xfrm>
         </p:grpSpPr>
         <p:pic>
@@ -38401,7 +36900,7 @@
           <p:spPr>
             <a:xfrm>
               <a:off x="6751637" y="2844854"/>
-              <a:ext cx="5153911" cy="369332"/>
+              <a:ext cx="7914154" cy="523220"/>
             </a:xfrm>
             <a:prstGeom prst="rect">
               <a:avLst/>
@@ -38414,12 +36913,12 @@
             <a:lstStyle/>
             <a:p>
               <a:r>
-                <a:rPr lang="en-US" dirty="0">
+                <a:rPr lang="en-US" sz="2800" dirty="0">
                   <a:hlinkClick r:id="rId8"/>
                 </a:rPr>
                 <a:t>https://www.docker.com/products/docker-swarm</a:t>
               </a:r>
-              <a:endParaRPr lang="en-US" dirty="0"/>
+              <a:endParaRPr lang="en-US" sz="2800" dirty="0"/>
             </a:p>
           </p:txBody>
         </p:sp>
@@ -39567,8 +38066,8 @@
         </p:nvSpPr>
         <p:spPr>
           <a:xfrm>
-            <a:off x="549275" y="3364864"/>
-            <a:ext cx="11887200" cy="3447098"/>
+            <a:off x="274639" y="2725856"/>
+            <a:ext cx="12145962" cy="4124206"/>
           </a:xfrm>
         </p:spPr>
         <p:txBody>
@@ -39577,7 +38076,7 @@
           <a:p>
             <a:r>
               <a:rPr lang="en-US" dirty="0"/>
-              <a:t>We’re going to focus on Windows Server 2016</a:t>
+              <a:t>Focus on Windows Server 2016</a:t>
             </a:r>
           </a:p>
           <a:p>
@@ -39603,6 +38102,21 @@
               <a:rPr lang="en-US" dirty="0"/>
               <a:t>We’re not going to make you an expert</a:t>
             </a:r>
+          </a:p>
+          <a:p>
+            <a:r>
+              <a:rPr lang="en-US" dirty="0"/>
+              <a:t>	</a:t>
+            </a:r>
+            <a:r>
+              <a:rPr lang="en-US" dirty="0">
+                <a:solidFill>
+                  <a:schemeClr val="tx1"/>
+                </a:solidFill>
+              </a:rPr>
+              <a:t>Remove the fear!</a:t>
+            </a:r>
+            <a:endParaRPr lang="en-US" dirty="0"/>
           </a:p>
           <a:p>
             <a:endParaRPr lang="en-US" sz="2000" dirty="0"/>
@@ -39809,6 +38323,37 @@
                                   </p:childTnLst>
                                 </p:cTn>
                               </p:par>
+                              <p:par>
+                                <p:cTn id="13" presetID="1" presetClass="entr" presetSubtype="0" fill="hold" nodeType="withEffect">
+                                  <p:stCondLst>
+                                    <p:cond delay="0"/>
+                                  </p:stCondLst>
+                                  <p:childTnLst>
+                                    <p:set>
+                                      <p:cBhvr>
+                                        <p:cTn id="14" dur="1" fill="hold">
+                                          <p:stCondLst>
+                                            <p:cond delay="0"/>
+                                          </p:stCondLst>
+                                        </p:cTn>
+                                        <p:tgtEl>
+                                          <p:spTgt spid="6">
+                                            <p:txEl>
+                                              <p:pRg st="4" end="4"/>
+                                            </p:txEl>
+                                          </p:spTgt>
+                                        </p:tgtEl>
+                                        <p:attrNameLst>
+                                          <p:attrName>style.visibility</p:attrName>
+                                        </p:attrNameLst>
+                                      </p:cBhvr>
+                                      <p:to>
+                                        <p:strVal val="visible"/>
+                                      </p:to>
+                                    </p:set>
+                                  </p:childTnLst>
+                                </p:cTn>
+                              </p:par>
                             </p:childTnLst>
                           </p:cTn>
                         </p:par>
@@ -39816,26 +38361,26 @@
                     </p:cTn>
                   </p:par>
                   <p:par>
-                    <p:cTn id="13" fill="hold">
+                    <p:cTn id="15" fill="hold">
                       <p:stCondLst>
                         <p:cond delay="indefinite"/>
                       </p:stCondLst>
                       <p:childTnLst>
                         <p:par>
-                          <p:cTn id="14" fill="hold">
+                          <p:cTn id="16" fill="hold">
                             <p:stCondLst>
                               <p:cond delay="0"/>
                             </p:stCondLst>
                             <p:childTnLst>
                               <p:par>
-                                <p:cTn id="15" presetID="1" presetClass="entr" presetSubtype="0" fill="hold" nodeType="clickEffect">
+                                <p:cTn id="17" presetID="1" presetClass="entr" presetSubtype="0" fill="hold" nodeType="clickEffect">
                                   <p:stCondLst>
                                     <p:cond delay="0"/>
                                   </p:stCondLst>
                                   <p:childTnLst>
                                     <p:set>
                                       <p:cBhvr>
-                                        <p:cTn id="16" dur="1" fill="hold">
+                                        <p:cTn id="18" dur="1" fill="hold">
                                           <p:stCondLst>
                                             <p:cond delay="0"/>
                                           </p:stCondLst>
@@ -39843,7 +38388,7 @@
                                         <p:tgtEl>
                                           <p:spTgt spid="6">
                                             <p:txEl>
-                                              <p:pRg st="5" end="5"/>
+                                              <p:pRg st="6" end="6"/>
                                             </p:txEl>
                                           </p:spTgt>
                                         </p:tgtEl>
@@ -40350,7 +38895,7 @@
                   <a:schemeClr val="tx1"/>
                 </a:solidFill>
               </a:rPr>
-              <a:t>hub.hub.docker.com</a:t>
+              <a:t>hub.docker.com</a:t>
             </a:r>
           </a:p>
         </p:txBody>
@@ -49708,84 +48253,12 @@
 </file>
 
 <file path=customXml/item1.xml><?xml version="1.0" encoding="utf-8"?>
-<p:properties xmlns:p="http://schemas.microsoft.com/office/2006/metadata/properties" xmlns:xsi="http://www.w3.org/2001/XMLSchema-instance" xmlns:pc="http://schemas.microsoft.com/office/infopath/2007/PartnerControls">
-  <documentManagement>
-    <LikesCount xmlns="http://schemas.microsoft.com/sharepoint/v3" xsi:nil="true"/>
-    <d12e2661e9634d9aa98bbb375f31aced xmlns="01c77077-aee4-4b5f-bd4e-9cd40a6fff29">
-      <Terms xmlns="http://schemas.microsoft.com/office/infopath/2007/PartnerControls">
-        <TermInfo xmlns="http://schemas.microsoft.com/office/infopath/2007/PartnerControls">
-          <TermName xmlns="http://schemas.microsoft.com/office/infopath/2007/PartnerControls">Moscone Center</TermName>
-          <TermId xmlns="http://schemas.microsoft.com/office/infopath/2007/PartnerControls">d4f36a2e-dd0d-4424-990f-7c93b4e9f063</TermId>
-        </TermInfo>
-      </Terms>
-    </d12e2661e9634d9aa98bbb375f31aced>
-    <Event_x0020_Start_x0020_Date xmlns="01c77077-aee4-4b5f-bd4e-9cd40a6fff29">2016-03-30T07:00:00+00:00</Event_x0020_Start_x0020_Date>
-    <Target_x0020_Audiences xmlns="8ff673fc-3231-4e3a-893b-6d7f7cd32766" xsi:nil="true"/>
-    <iaa5f83406f94009a0f6a3e890699ff7 xmlns="01c77077-aee4-4b5f-bd4e-9cd40a6fff29">
-      <Terms xmlns="http://schemas.microsoft.com/office/infopath/2007/PartnerControls">
-        <TermInfo xmlns="http://schemas.microsoft.com/office/infopath/2007/PartnerControls">
-          <TermName xmlns="http://schemas.microsoft.com/office/infopath/2007/PartnerControls">San Francisco</TermName>
-          <TermId xmlns="http://schemas.microsoft.com/office/infopath/2007/PartnerControls">84dfcb53-432b-499d-8965-93d483d36b4a</TermId>
-        </TermInfo>
-      </Terms>
-    </iaa5f83406f94009a0f6a3e890699ff7>
-    <External_x0020_Speaker xmlns="01c77077-aee4-4b5f-bd4e-9cd40a6fff29" xsi:nil="true"/>
-    <m6878b9dd7994da4ba144f95347d99c6 xmlns="01c77077-aee4-4b5f-bd4e-9cd40a6fff29">
-      <Terms xmlns="http://schemas.microsoft.com/office/infopath/2007/PartnerControls"/>
-    </m6878b9dd7994da4ba144f95347d99c6>
-    <Presentation_x0020_Date xmlns="01c77077-aee4-4b5f-bd4e-9cd40a6fff29" xsi:nil="true"/>
-    <fc15c16204564de583b4c942b10d19ec xmlns="01c77077-aee4-4b5f-bd4e-9cd40a6fff29">
-      <Terms xmlns="http://schemas.microsoft.com/office/infopath/2007/PartnerControls"/>
-    </fc15c16204564de583b4c942b10d19ec>
-    <mb2e01f7e2d8413988e28e59aa226eec xmlns="01c77077-aee4-4b5f-bd4e-9cd40a6fff29">
-      <Terms xmlns="http://schemas.microsoft.com/office/infopath/2007/PartnerControls">
-        <TermInfo xmlns="http://schemas.microsoft.com/office/infopath/2007/PartnerControls">
-          <TermName xmlns="http://schemas.microsoft.com/office/infopath/2007/PartnerControls">Build</TermName>
-          <TermId xmlns="http://schemas.microsoft.com/office/infopath/2007/PartnerControls">58542b36-5bf5-46a6-a53f-a41fb7a73785</TermId>
-        </TermInfo>
-      </Terms>
-    </mb2e01f7e2d8413988e28e59aa226eec>
-    <MS_x0020_Content_x0020_Owner xmlns="01c77077-aee4-4b5f-bd4e-9cd40a6fff29">
-      <UserInfo>
-        <DisplayName/>
-        <AccountId xsi:nil="true"/>
-        <AccountType/>
-      </UserInfo>
-    </MS_x0020_Content_x0020_Owner>
-    <Session_x0020_Code xmlns="01c77077-aee4-4b5f-bd4e-9cd40a6fff29" xsi:nil="true"/>
-    <Event_x0020_End_x0020_Date xmlns="01c77077-aee4-4b5f-bd4e-9cd40a6fff29">2016-04-01T07:00:00+00:00</Event_x0020_End_x0020_Date>
-    <o1010385baed4da9b5076a6aa651d1e5 xmlns="01c77077-aee4-4b5f-bd4e-9cd40a6fff29">
-      <Terms xmlns="http://schemas.microsoft.com/office/infopath/2007/PartnerControls"/>
-    </o1010385baed4da9b5076a6aa651d1e5>
-    <kc6d1bd9a46e4e5fbbbf99ca3de7a092 xmlns="01c77077-aee4-4b5f-bd4e-9cd40a6fff29">
-      <Terms xmlns="http://schemas.microsoft.com/office/infopath/2007/PartnerControls"/>
-    </kc6d1bd9a46e4e5fbbbf99ca3de7a092>
-    <MS_x0020_Speaker xmlns="01c77077-aee4-4b5f-bd4e-9cd40a6fff29">
-      <UserInfo>
-        <DisplayName/>
-        <AccountId xsi:nil="true"/>
-        <AccountType/>
-      </UserInfo>
-    </MS_x0020_Speaker>
-    <TaxKeywordTaxHTField xmlns="230e9df3-be65-4c73-a93b-d1236ebd677e">
-      <Terms xmlns="http://schemas.microsoft.com/office/infopath/2007/PartnerControls">
-        <TermInfo xmlns="http://schemas.microsoft.com/office/infopath/2007/PartnerControls">
-          <TermName xmlns="http://schemas.microsoft.com/office/infopath/2007/PartnerControls">Microsoft Build 2016</TermName>
-          <TermId xmlns="http://schemas.microsoft.com/office/infopath/2007/PartnerControls">da8a10b5-9bc3-4217-80aa-6b60d6ec1cee</TermId>
-        </TermInfo>
-      </Terms>
-    </TaxKeywordTaxHTField>
-    <TaxCatchAll xmlns="230e9df3-be65-4c73-a93b-d1236ebd677e">
-      <Value>48</Value>
-      <Value>47</Value>
-      <Value>46</Value>
-      <Value>49</Value>
-    </TaxCatchAll>
-    <NumberofDownloads xmlns="230e9df3-be65-4c73-a93b-d1236ebd677e" xsi:nil="true"/>
-    <_ip_UnifiedCompliancePolicyUIAction xmlns="http://schemas.microsoft.com/sharepoint/v3" xsi:nil="true"/>
-    <_ip_UnifiedCompliancePolicyProperties xmlns="http://schemas.microsoft.com/sharepoint/v3" xsi:nil="true"/>
-  </documentManagement>
-</p:properties>
+<?mso-contentType ?>
+<FormTemplates xmlns="http://schemas.microsoft.com/sharepoint/v3/contenttype/forms">
+  <Display>DocumentLibraryForm</Display>
+  <Edit>DocumentLibraryForm</Edit>
+  <New>DocumentLibraryForm</New>
+</FormTemplates>
 </file>
 
 <file path=customXml/item2.xml><?xml version="1.0" encoding="utf-8"?>
@@ -50172,29 +48645,90 @@
 </file>
 
 <file path=customXml/item3.xml><?xml version="1.0" encoding="utf-8"?>
-<?mso-contentType ?>
-<FormTemplates xmlns="http://schemas.microsoft.com/sharepoint/v3/contenttype/forms">
-  <Display>DocumentLibraryForm</Display>
-  <Edit>DocumentLibraryForm</Edit>
-  <New>DocumentLibraryForm</New>
-</FormTemplates>
+<p:properties xmlns:p="http://schemas.microsoft.com/office/2006/metadata/properties" xmlns:xsi="http://www.w3.org/2001/XMLSchema-instance" xmlns:pc="http://schemas.microsoft.com/office/infopath/2007/PartnerControls">
+  <documentManagement>
+    <LikesCount xmlns="http://schemas.microsoft.com/sharepoint/v3" xsi:nil="true"/>
+    <d12e2661e9634d9aa98bbb375f31aced xmlns="01c77077-aee4-4b5f-bd4e-9cd40a6fff29">
+      <Terms xmlns="http://schemas.microsoft.com/office/infopath/2007/PartnerControls">
+        <TermInfo xmlns="http://schemas.microsoft.com/office/infopath/2007/PartnerControls">
+          <TermName xmlns="http://schemas.microsoft.com/office/infopath/2007/PartnerControls">Moscone Center</TermName>
+          <TermId xmlns="http://schemas.microsoft.com/office/infopath/2007/PartnerControls">d4f36a2e-dd0d-4424-990f-7c93b4e9f063</TermId>
+        </TermInfo>
+      </Terms>
+    </d12e2661e9634d9aa98bbb375f31aced>
+    <Event_x0020_Start_x0020_Date xmlns="01c77077-aee4-4b5f-bd4e-9cd40a6fff29">2016-03-30T07:00:00+00:00</Event_x0020_Start_x0020_Date>
+    <Target_x0020_Audiences xmlns="8ff673fc-3231-4e3a-893b-6d7f7cd32766" xsi:nil="true"/>
+    <iaa5f83406f94009a0f6a3e890699ff7 xmlns="01c77077-aee4-4b5f-bd4e-9cd40a6fff29">
+      <Terms xmlns="http://schemas.microsoft.com/office/infopath/2007/PartnerControls">
+        <TermInfo xmlns="http://schemas.microsoft.com/office/infopath/2007/PartnerControls">
+          <TermName xmlns="http://schemas.microsoft.com/office/infopath/2007/PartnerControls">San Francisco</TermName>
+          <TermId xmlns="http://schemas.microsoft.com/office/infopath/2007/PartnerControls">84dfcb53-432b-499d-8965-93d483d36b4a</TermId>
+        </TermInfo>
+      </Terms>
+    </iaa5f83406f94009a0f6a3e890699ff7>
+    <External_x0020_Speaker xmlns="01c77077-aee4-4b5f-bd4e-9cd40a6fff29" xsi:nil="true"/>
+    <m6878b9dd7994da4ba144f95347d99c6 xmlns="01c77077-aee4-4b5f-bd4e-9cd40a6fff29">
+      <Terms xmlns="http://schemas.microsoft.com/office/infopath/2007/PartnerControls"/>
+    </m6878b9dd7994da4ba144f95347d99c6>
+    <Presentation_x0020_Date xmlns="01c77077-aee4-4b5f-bd4e-9cd40a6fff29" xsi:nil="true"/>
+    <fc15c16204564de583b4c942b10d19ec xmlns="01c77077-aee4-4b5f-bd4e-9cd40a6fff29">
+      <Terms xmlns="http://schemas.microsoft.com/office/infopath/2007/PartnerControls"/>
+    </fc15c16204564de583b4c942b10d19ec>
+    <mb2e01f7e2d8413988e28e59aa226eec xmlns="01c77077-aee4-4b5f-bd4e-9cd40a6fff29">
+      <Terms xmlns="http://schemas.microsoft.com/office/infopath/2007/PartnerControls">
+        <TermInfo xmlns="http://schemas.microsoft.com/office/infopath/2007/PartnerControls">
+          <TermName xmlns="http://schemas.microsoft.com/office/infopath/2007/PartnerControls">Build</TermName>
+          <TermId xmlns="http://schemas.microsoft.com/office/infopath/2007/PartnerControls">58542b36-5bf5-46a6-a53f-a41fb7a73785</TermId>
+        </TermInfo>
+      </Terms>
+    </mb2e01f7e2d8413988e28e59aa226eec>
+    <MS_x0020_Content_x0020_Owner xmlns="01c77077-aee4-4b5f-bd4e-9cd40a6fff29">
+      <UserInfo>
+        <DisplayName/>
+        <AccountId xsi:nil="true"/>
+        <AccountType/>
+      </UserInfo>
+    </MS_x0020_Content_x0020_Owner>
+    <Session_x0020_Code xmlns="01c77077-aee4-4b5f-bd4e-9cd40a6fff29" xsi:nil="true"/>
+    <Event_x0020_End_x0020_Date xmlns="01c77077-aee4-4b5f-bd4e-9cd40a6fff29">2016-04-01T07:00:00+00:00</Event_x0020_End_x0020_Date>
+    <o1010385baed4da9b5076a6aa651d1e5 xmlns="01c77077-aee4-4b5f-bd4e-9cd40a6fff29">
+      <Terms xmlns="http://schemas.microsoft.com/office/infopath/2007/PartnerControls"/>
+    </o1010385baed4da9b5076a6aa651d1e5>
+    <kc6d1bd9a46e4e5fbbbf99ca3de7a092 xmlns="01c77077-aee4-4b5f-bd4e-9cd40a6fff29">
+      <Terms xmlns="http://schemas.microsoft.com/office/infopath/2007/PartnerControls"/>
+    </kc6d1bd9a46e4e5fbbbf99ca3de7a092>
+    <MS_x0020_Speaker xmlns="01c77077-aee4-4b5f-bd4e-9cd40a6fff29">
+      <UserInfo>
+        <DisplayName/>
+        <AccountId xsi:nil="true"/>
+        <AccountType/>
+      </UserInfo>
+    </MS_x0020_Speaker>
+    <TaxKeywordTaxHTField xmlns="230e9df3-be65-4c73-a93b-d1236ebd677e">
+      <Terms xmlns="http://schemas.microsoft.com/office/infopath/2007/PartnerControls">
+        <TermInfo xmlns="http://schemas.microsoft.com/office/infopath/2007/PartnerControls">
+          <TermName xmlns="http://schemas.microsoft.com/office/infopath/2007/PartnerControls">Microsoft Build 2016</TermName>
+          <TermId xmlns="http://schemas.microsoft.com/office/infopath/2007/PartnerControls">da8a10b5-9bc3-4217-80aa-6b60d6ec1cee</TermId>
+        </TermInfo>
+      </Terms>
+    </TaxKeywordTaxHTField>
+    <TaxCatchAll xmlns="230e9df3-be65-4c73-a93b-d1236ebd677e">
+      <Value>48</Value>
+      <Value>47</Value>
+      <Value>46</Value>
+      <Value>49</Value>
+    </TaxCatchAll>
+    <NumberofDownloads xmlns="230e9df3-be65-4c73-a93b-d1236ebd677e" xsi:nil="true"/>
+    <_ip_UnifiedCompliancePolicyUIAction xmlns="http://schemas.microsoft.com/sharepoint/v3" xsi:nil="true"/>
+    <_ip_UnifiedCompliancePolicyProperties xmlns="http://schemas.microsoft.com/sharepoint/v3" xsi:nil="true"/>
+  </documentManagement>
+</p:properties>
 </file>
 
 <file path=customXml/itemProps1.xml><?xml version="1.0" encoding="utf-8"?>
-<ds:datastoreItem xmlns:ds="http://schemas.openxmlformats.org/officeDocument/2006/customXml" ds:itemID="{F990F116-B58F-4255-B05B-DA3808E0E5C6}">
+<ds:datastoreItem xmlns:ds="http://schemas.openxmlformats.org/officeDocument/2006/customXml" ds:itemID="{758FDAC0-319D-4A54-8D8E-1D42CB1F8004}">
   <ds:schemaRefs>
-    <ds:schemaRef ds:uri="http://schemas.microsoft.com/office/2006/metadata/properties"/>
-    <ds:schemaRef ds:uri="8ff673fc-3231-4e3a-893b-6d7f7cd32766"/>
-    <ds:schemaRef ds:uri="http://schemas.microsoft.com/sharepoint/v3"/>
-    <ds:schemaRef ds:uri="230e9df3-be65-4c73-a93b-d1236ebd677e"/>
-    <ds:schemaRef ds:uri="http://purl.org/dc/terms/"/>
-    <ds:schemaRef ds:uri="01c77077-aee4-4b5f-bd4e-9cd40a6fff29"/>
-    <ds:schemaRef ds:uri="http://schemas.microsoft.com/office/2006/documentManagement/types"/>
-    <ds:schemaRef ds:uri="http://schemas.microsoft.com/office/infopath/2007/PartnerControls"/>
-    <ds:schemaRef ds:uri="http://purl.org/dc/elements/1.1/"/>
-    <ds:schemaRef ds:uri="http://schemas.openxmlformats.org/package/2006/metadata/core-properties"/>
-    <ds:schemaRef ds:uri="http://www.w3.org/XML/1998/namespace"/>
-    <ds:schemaRef ds:uri="http://purl.org/dc/dcmitype/"/>
+    <ds:schemaRef ds:uri="http://schemas.microsoft.com/sharepoint/v3/contenttype/forms"/>
   </ds:schemaRefs>
 </ds:datastoreItem>
 </file>
@@ -50221,9 +48755,20 @@
 </file>
 
 <file path=customXml/itemProps3.xml><?xml version="1.0" encoding="utf-8"?>
-<ds:datastoreItem xmlns:ds="http://schemas.openxmlformats.org/officeDocument/2006/customXml" ds:itemID="{758FDAC0-319D-4A54-8D8E-1D42CB1F8004}">
+<ds:datastoreItem xmlns:ds="http://schemas.openxmlformats.org/officeDocument/2006/customXml" ds:itemID="{F990F116-B58F-4255-B05B-DA3808E0E5C6}">
   <ds:schemaRefs>
-    <ds:schemaRef ds:uri="http://schemas.microsoft.com/sharepoint/v3/contenttype/forms"/>
+    <ds:schemaRef ds:uri="http://schemas.microsoft.com/office/2006/metadata/properties"/>
+    <ds:schemaRef ds:uri="8ff673fc-3231-4e3a-893b-6d7f7cd32766"/>
+    <ds:schemaRef ds:uri="http://schemas.microsoft.com/sharepoint/v3"/>
+    <ds:schemaRef ds:uri="230e9df3-be65-4c73-a93b-d1236ebd677e"/>
+    <ds:schemaRef ds:uri="http://purl.org/dc/terms/"/>
+    <ds:schemaRef ds:uri="01c77077-aee4-4b5f-bd4e-9cd40a6fff29"/>
+    <ds:schemaRef ds:uri="http://schemas.microsoft.com/office/2006/documentManagement/types"/>
+    <ds:schemaRef ds:uri="http://schemas.microsoft.com/office/infopath/2007/PartnerControls"/>
+    <ds:schemaRef ds:uri="http://purl.org/dc/elements/1.1/"/>
+    <ds:schemaRef ds:uri="http://schemas.openxmlformats.org/package/2006/metadata/core-properties"/>
+    <ds:schemaRef ds:uri="http://www.w3.org/XML/1998/namespace"/>
+    <ds:schemaRef ds:uri="http://purl.org/dc/dcmitype/"/>
   </ds:schemaRefs>
 </ds:datastoreItem>
 </file>
</xml_diff>